<commit_message>
metadata in excel episode
</commit_message>
<xml_diff>
--- a/instructors/03_Data-in-excel_v3.3.pptx
+++ b/instructors/03_Data-in-excel_v3.3.pptx
@@ -4985,18 +4985,26 @@
                   <a:srgbClr val="0070C0"/>
                 </a:solidFill>
               </a:rPr>
-              <a:t>Male 30	=&gt; Male | 30</a:t>
+              <a:t>M30	=&gt; Male | 30</a:t>
             </a:r>
           </a:p>
           <a:p>
             <a:pPr lvl="1"/>
             <a:r>
+              <a:rPr lang="pl-PL" sz="2000">
+                <a:solidFill>
+                  <a:srgbClr val="0070C0"/>
+                </a:solidFill>
+              </a:rPr>
+              <a:t>F28		=&gt; </a:t>
+            </a:r>
+            <a:r>
               <a:rPr lang="pl-PL" sz="2000" dirty="0">
                 <a:solidFill>
                   <a:srgbClr val="0070C0"/>
                 </a:solidFill>
               </a:rPr>
-              <a:t>Female 28	=&gt; Female | 30</a:t>
+              <a:t>Female | 30</a:t>
             </a:r>
           </a:p>
           <a:p>

</xml_diff>

<commit_message>
added one more excel example
</commit_message>
<xml_diff>
--- a/instructors/03_Data-in-excel_v3.3.pptx
+++ b/instructors/03_Data-in-excel_v3.3.pptx
@@ -5,7 +5,7 @@
     <p:sldMasterId id="2147483648" r:id="rId1"/>
   </p:sldMasterIdLst>
   <p:notesMasterIdLst>
-    <p:notesMasterId r:id="rId34"/>
+    <p:notesMasterId r:id="rId35"/>
   </p:notesMasterIdLst>
   <p:sldIdLst>
     <p:sldId id="256" r:id="rId2"/>
@@ -19,27 +19,28 @@
     <p:sldId id="287" r:id="rId10"/>
     <p:sldId id="259" r:id="rId11"/>
     <p:sldId id="302" r:id="rId12"/>
-    <p:sldId id="304" r:id="rId13"/>
-    <p:sldId id="303" r:id="rId14"/>
-    <p:sldId id="282" r:id="rId15"/>
-    <p:sldId id="305" r:id="rId16"/>
-    <p:sldId id="307" r:id="rId17"/>
-    <p:sldId id="308" r:id="rId18"/>
-    <p:sldId id="289" r:id="rId19"/>
-    <p:sldId id="297" r:id="rId20"/>
-    <p:sldId id="298" r:id="rId21"/>
-    <p:sldId id="299" r:id="rId22"/>
-    <p:sldId id="300" r:id="rId23"/>
-    <p:sldId id="301" r:id="rId24"/>
-    <p:sldId id="280" r:id="rId25"/>
-    <p:sldId id="262" r:id="rId26"/>
-    <p:sldId id="277" r:id="rId27"/>
-    <p:sldId id="290" r:id="rId28"/>
-    <p:sldId id="309" r:id="rId29"/>
-    <p:sldId id="310" r:id="rId30"/>
-    <p:sldId id="291" r:id="rId31"/>
-    <p:sldId id="272" r:id="rId32"/>
-    <p:sldId id="311" r:id="rId33"/>
+    <p:sldId id="312" r:id="rId13"/>
+    <p:sldId id="382" r:id="rId14"/>
+    <p:sldId id="383" r:id="rId15"/>
+    <p:sldId id="384" r:id="rId16"/>
+    <p:sldId id="386" r:id="rId17"/>
+    <p:sldId id="279" r:id="rId18"/>
+    <p:sldId id="387" r:id="rId19"/>
+    <p:sldId id="388" r:id="rId20"/>
+    <p:sldId id="389" r:id="rId21"/>
+    <p:sldId id="390" r:id="rId22"/>
+    <p:sldId id="391" r:id="rId23"/>
+    <p:sldId id="392" r:id="rId24"/>
+    <p:sldId id="393" r:id="rId25"/>
+    <p:sldId id="394" r:id="rId26"/>
+    <p:sldId id="395" r:id="rId27"/>
+    <p:sldId id="396" r:id="rId28"/>
+    <p:sldId id="397" r:id="rId29"/>
+    <p:sldId id="398" r:id="rId30"/>
+    <p:sldId id="402" r:id="rId31"/>
+    <p:sldId id="399" r:id="rId32"/>
+    <p:sldId id="400" r:id="rId33"/>
+    <p:sldId id="401" r:id="rId34"/>
   </p:sldIdLst>
   <p:sldSz cx="12192000" cy="6858000"/>
   <p:notesSz cx="6858000" cy="9144000"/>
@@ -228,7 +229,7 @@
           <a:p>
             <a:fld id="{585C48AE-4A1E-9A43-835F-510354165F99}" type="datetimeFigureOut">
               <a:rPr lang="en-GB" smtClean="0"/>
-              <a:t>27/02/2024</a:t>
+              <a:t>20/03/2024</a:t>
             </a:fld>
             <a:endParaRPr lang="en-GB"/>
           </a:p>
@@ -495,6 +496,90 @@
 </p:notesMaster>
 </file>
 
+<file path=ppt/notesSlides/notesSlide1.xml><?xml version="1.0" encoding="utf-8"?>
+<p:notes xmlns:a="http://schemas.openxmlformats.org/drawingml/2006/main" xmlns:r="http://schemas.openxmlformats.org/officeDocument/2006/relationships" xmlns:p="http://schemas.openxmlformats.org/presentationml/2006/main">
+  <p:cSld>
+    <p:spTree>
+      <p:nvGrpSpPr>
+        <p:cNvPr id="1" name=""/>
+        <p:cNvGrpSpPr/>
+        <p:nvPr/>
+      </p:nvGrpSpPr>
+      <p:grpSpPr>
+        <a:xfrm>
+          <a:off x="0" y="0"/>
+          <a:ext cx="0" cy="0"/>
+          <a:chOff x="0" y="0"/>
+          <a:chExt cx="0" cy="0"/>
+        </a:xfrm>
+      </p:grpSpPr>
+      <p:sp>
+        <p:nvSpPr>
+          <p:cNvPr id="2" name="Slide Image Placeholder 1"/>
+          <p:cNvSpPr>
+            <a:spLocks noGrp="1" noRot="1" noChangeAspect="1"/>
+          </p:cNvSpPr>
+          <p:nvPr>
+            <p:ph type="sldImg"/>
+          </p:nvPr>
+        </p:nvSpPr>
+        <p:spPr/>
+      </p:sp>
+      <p:sp>
+        <p:nvSpPr>
+          <p:cNvPr id="3" name="Notes Placeholder 2"/>
+          <p:cNvSpPr>
+            <a:spLocks noGrp="1"/>
+          </p:cNvSpPr>
+          <p:nvPr>
+            <p:ph type="body" idx="1"/>
+          </p:nvPr>
+        </p:nvSpPr>
+        <p:spPr/>
+        <p:txBody>
+          <a:bodyPr/>
+          <a:lstStyle/>
+          <a:p>
+            <a:endParaRPr lang="en-GB" dirty="0"/>
+          </a:p>
+        </p:txBody>
+      </p:sp>
+      <p:sp>
+        <p:nvSpPr>
+          <p:cNvPr id="4" name="Slide Number Placeholder 3"/>
+          <p:cNvSpPr>
+            <a:spLocks noGrp="1"/>
+          </p:cNvSpPr>
+          <p:nvPr>
+            <p:ph type="sldNum" sz="quarter" idx="5"/>
+          </p:nvPr>
+        </p:nvSpPr>
+        <p:spPr/>
+        <p:txBody>
+          <a:bodyPr/>
+          <a:lstStyle/>
+          <a:p>
+            <a:fld id="{B361C124-7373-F149-A166-BB8240B9FE77}" type="slidenum">
+              <a:rPr lang="en-GB" smtClean="0"/>
+              <a:t>12</a:t>
+            </a:fld>
+            <a:endParaRPr lang="en-GB"/>
+          </a:p>
+        </p:txBody>
+      </p:sp>
+    </p:spTree>
+    <p:extLst>
+      <p:ext uri="{BB962C8B-B14F-4D97-AF65-F5344CB8AC3E}">
+        <p14:creationId xmlns:p14="http://schemas.microsoft.com/office/powerpoint/2010/main" val="155670664"/>
+      </p:ext>
+    </p:extLst>
+  </p:cSld>
+  <p:clrMapOvr>
+    <a:masterClrMapping/>
+  </p:clrMapOvr>
+</p:notes>
+</file>
+
 <file path=ppt/slideLayouts/slideLayout1.xml><?xml version="1.0" encoding="utf-8"?>
 <p:sldLayout xmlns:a="http://schemas.openxmlformats.org/drawingml/2006/main" xmlns:r="http://schemas.openxmlformats.org/officeDocument/2006/relationships" xmlns:p="http://schemas.openxmlformats.org/presentationml/2006/main" type="title" preserve="1">
   <p:cSld name="Title Slide">
@@ -644,7 +729,7 @@
           <a:p>
             <a:fld id="{5913FB77-D8DB-4AB9-8EA5-EE8C3B57A5E1}" type="datetimeFigureOut">
               <a:rPr lang="en-GB" smtClean="0"/>
-              <a:t>27/02/2024</a:t>
+              <a:t>20/03/2024</a:t>
             </a:fld>
             <a:endParaRPr lang="en-GB"/>
           </a:p>
@@ -891,7 +976,7 @@
           <a:p>
             <a:fld id="{5913FB77-D8DB-4AB9-8EA5-EE8C3B57A5E1}" type="datetimeFigureOut">
               <a:rPr lang="en-GB" smtClean="0"/>
-              <a:t>27/02/2024</a:t>
+              <a:t>20/03/2024</a:t>
             </a:fld>
             <a:endParaRPr lang="en-GB"/>
           </a:p>
@@ -1101,7 +1186,7 @@
           <a:p>
             <a:fld id="{5913FB77-D8DB-4AB9-8EA5-EE8C3B57A5E1}" type="datetimeFigureOut">
               <a:rPr lang="en-GB" smtClean="0"/>
-              <a:t>27/02/2024</a:t>
+              <a:t>20/03/2024</a:t>
             </a:fld>
             <a:endParaRPr lang="en-GB"/>
           </a:p>
@@ -1301,7 +1386,7 @@
           <a:p>
             <a:fld id="{5913FB77-D8DB-4AB9-8EA5-EE8C3B57A5E1}" type="datetimeFigureOut">
               <a:rPr lang="en-GB" smtClean="0"/>
-              <a:t>27/02/2024</a:t>
+              <a:t>20/03/2024</a:t>
             </a:fld>
             <a:endParaRPr lang="en-GB"/>
           </a:p>
@@ -1577,7 +1662,7 @@
           <a:p>
             <a:fld id="{5913FB77-D8DB-4AB9-8EA5-EE8C3B57A5E1}" type="datetimeFigureOut">
               <a:rPr lang="en-GB" smtClean="0"/>
-              <a:t>27/02/2024</a:t>
+              <a:t>20/03/2024</a:t>
             </a:fld>
             <a:endParaRPr lang="en-GB"/>
           </a:p>
@@ -1845,7 +1930,7 @@
           <a:p>
             <a:fld id="{5913FB77-D8DB-4AB9-8EA5-EE8C3B57A5E1}" type="datetimeFigureOut">
               <a:rPr lang="en-GB" smtClean="0"/>
-              <a:t>27/02/2024</a:t>
+              <a:t>20/03/2024</a:t>
             </a:fld>
             <a:endParaRPr lang="en-GB"/>
           </a:p>
@@ -2260,7 +2345,7 @@
           <a:p>
             <a:fld id="{5913FB77-D8DB-4AB9-8EA5-EE8C3B57A5E1}" type="datetimeFigureOut">
               <a:rPr lang="en-GB" smtClean="0"/>
-              <a:t>27/02/2024</a:t>
+              <a:t>20/03/2024</a:t>
             </a:fld>
             <a:endParaRPr lang="en-GB"/>
           </a:p>
@@ -2402,7 +2487,7 @@
           <a:p>
             <a:fld id="{5913FB77-D8DB-4AB9-8EA5-EE8C3B57A5E1}" type="datetimeFigureOut">
               <a:rPr lang="en-GB" smtClean="0"/>
-              <a:t>27/02/2024</a:t>
+              <a:t>20/03/2024</a:t>
             </a:fld>
             <a:endParaRPr lang="en-GB"/>
           </a:p>
@@ -2515,7 +2600,7 @@
           <a:p>
             <a:fld id="{5913FB77-D8DB-4AB9-8EA5-EE8C3B57A5E1}" type="datetimeFigureOut">
               <a:rPr lang="en-GB" smtClean="0"/>
-              <a:t>27/02/2024</a:t>
+              <a:t>20/03/2024</a:t>
             </a:fld>
             <a:endParaRPr lang="en-GB"/>
           </a:p>
@@ -2828,7 +2913,7 @@
           <a:p>
             <a:fld id="{5913FB77-D8DB-4AB9-8EA5-EE8C3B57A5E1}" type="datetimeFigureOut">
               <a:rPr lang="en-GB" smtClean="0"/>
-              <a:t>27/02/2024</a:t>
+              <a:t>20/03/2024</a:t>
             </a:fld>
             <a:endParaRPr lang="en-GB"/>
           </a:p>
@@ -3117,7 +3202,7 @@
           <a:p>
             <a:fld id="{5913FB77-D8DB-4AB9-8EA5-EE8C3B57A5E1}" type="datetimeFigureOut">
               <a:rPr lang="en-GB" smtClean="0"/>
-              <a:t>27/02/2024</a:t>
+              <a:t>20/03/2024</a:t>
             </a:fld>
             <a:endParaRPr lang="en-GB"/>
           </a:p>
@@ -3359,7 +3444,7 @@
             <a:fld id="{5913FB77-D8DB-4AB9-8EA5-EE8C3B57A5E1}" type="datetimeFigureOut">
               <a:rPr lang="en-GB" smtClean="0"/>
               <a:pPr/>
-              <a:t>27/02/2024</a:t>
+              <a:t>20/03/2024</a:t>
             </a:fld>
             <a:endParaRPr lang="en-GB"/>
           </a:p>
@@ -4547,7 +4632,7 @@
           <p:nvPr/>
         </p:nvPicPr>
         <p:blipFill>
-          <a:blip r:embed="rId2" cstate="hqprint">
+          <a:blip r:embed="rId3" cstate="hqprint">
             <a:extLst>
               <a:ext uri="{28A0092B-C50C-407E-A947-70E740481C1C}">
                 <a14:useLocalDpi xmlns:a14="http://schemas.microsoft.com/office/drawing/2010/main" val="0"/>
@@ -4627,7 +4712,7 @@
           <p:nvPr/>
         </p:nvPicPr>
         <p:blipFill>
-          <a:blip r:embed="rId3">
+          <a:blip r:embed="rId4">
             <a:extLst>
               <a:ext uri="{28A0092B-C50C-407E-A947-70E740481C1C}">
                 <a14:useLocalDpi xmlns:a14="http://schemas.microsoft.com/office/drawing/2010/main" val="0"/>
@@ -4648,10 +4733,63 @@
           </a:prstGeom>
         </p:spPr>
       </p:pic>
+      <p:sp>
+        <p:nvSpPr>
+          <p:cNvPr id="8" name="TextBox 7">
+            <a:extLst>
+              <a:ext uri="{FF2B5EF4-FFF2-40B4-BE49-F238E27FC236}">
+                <a16:creationId xmlns:a16="http://schemas.microsoft.com/office/drawing/2014/main" id="{E6FD1F1C-260E-4430-8522-B397A67548BC}"/>
+              </a:ext>
+            </a:extLst>
+          </p:cNvPr>
+          <p:cNvSpPr txBox="1"/>
+          <p:nvPr/>
+        </p:nvSpPr>
+        <p:spPr>
+          <a:xfrm>
+            <a:off x="1891830" y="6326552"/>
+            <a:ext cx="6096000" cy="430887"/>
+          </a:xfrm>
+          <a:prstGeom prst="rect">
+            <a:avLst/>
+          </a:prstGeom>
+          <a:noFill/>
+        </p:spPr>
+        <p:txBody>
+          <a:bodyPr wrap="square">
+            <a:spAutoFit/>
+          </a:bodyPr>
+          <a:lstStyle/>
+          <a:p>
+            <a:r>
+              <a:rPr lang="en-GB" sz="1100" dirty="0">
+                <a:solidFill>
+                  <a:schemeClr val="bg2">
+                    <a:lumMod val="50000"/>
+                  </a:schemeClr>
+                </a:solidFill>
+              </a:rPr>
+              <a:t>White et al. Nine simple ways to make it easier to (re)use your data</a:t>
+            </a:r>
+          </a:p>
+          <a:p>
+            <a:r>
+              <a:rPr lang="en-GB" sz="1100" dirty="0">
+                <a:solidFill>
+                  <a:schemeClr val="bg2">
+                    <a:lumMod val="50000"/>
+                  </a:schemeClr>
+                </a:solidFill>
+              </a:rPr>
+              <a:t>doi:10.4033/iee.2013.6b.6.f</a:t>
+            </a:r>
+          </a:p>
+        </p:txBody>
+      </p:sp>
     </p:spTree>
     <p:extLst>
       <p:ext uri="{BB962C8B-B14F-4D97-AF65-F5344CB8AC3E}">
-        <p14:creationId xmlns:p14="http://schemas.microsoft.com/office/powerpoint/2010/main" val="761327381"/>
+        <p14:creationId xmlns:p14="http://schemas.microsoft.com/office/powerpoint/2010/main" val="2877759691"/>
       </p:ext>
     </p:extLst>
   </p:cSld>
@@ -4692,8 +4830,8 @@
         </p:nvSpPr>
         <p:spPr>
           <a:xfrm>
-            <a:off x="769679" y="1269608"/>
-            <a:ext cx="9957794" cy="1692771"/>
+            <a:off x="838200" y="2230796"/>
+            <a:ext cx="8717280" cy="1692771"/>
           </a:xfrm>
           <a:prstGeom prst="rect">
             <a:avLst/>
@@ -4721,6 +4859,22 @@
           </a:p>
           <a:p>
             <a:pPr lvl="1"/>
+            <a:endParaRPr lang="en-GB" sz="2000" dirty="0">
+              <a:solidFill>
+                <a:srgbClr val="0070C0"/>
+              </a:solidFill>
+            </a:endParaRPr>
+          </a:p>
+          <a:p>
+            <a:pPr lvl="1"/>
+            <a:r>
+              <a:rPr lang="en-GB" sz="2000" dirty="0">
+                <a:solidFill>
+                  <a:srgbClr val="0070C0"/>
+                </a:solidFill>
+              </a:rPr>
+              <a:t>- Computers can’t interpret formatting easily. Better to keep a column/ field to record that data. </a:t>
+            </a:r>
             <a:br>
               <a:rPr lang="pl-PL" sz="2000" dirty="0">
                 <a:solidFill>
@@ -4734,22 +4888,7 @@
                   <a:srgbClr val="0070C0"/>
                 </a:solidFill>
               </a:rPr>
-              <a:t>Computers can’t interpret formatting easily. Better to keep a column/ field to record that data. </a:t>
-            </a:r>
-            <a:br>
-              <a:rPr lang="pl-PL" sz="2000" dirty="0">
-                <a:solidFill>
-                  <a:srgbClr val="0070C0"/>
-                </a:solidFill>
-              </a:rPr>
-            </a:br>
-            <a:r>
-              <a:rPr lang="en-GB" sz="2000" dirty="0">
-                <a:solidFill>
-                  <a:srgbClr val="0070C0"/>
-                </a:solidFill>
-              </a:rPr>
-              <a:t>Don’t merge cells.</a:t>
+              <a:t>- Don’t merge cells.</a:t>
             </a:r>
             <a:endParaRPr lang="en-GB" sz="2400" dirty="0">
               <a:solidFill>
@@ -4774,7 +4913,7 @@
           <p:nvPr/>
         </p:nvPicPr>
         <p:blipFill>
-          <a:blip r:embed="rId2" cstate="hqprint">
+          <a:blip r:embed="rId2" cstate="print">
             <a:extLst>
               <a:ext uri="{28A0092B-C50C-407E-A947-70E740481C1C}">
                 <a14:useLocalDpi xmlns:a14="http://schemas.microsoft.com/office/drawing/2010/main" val="0"/>
@@ -4808,7 +4947,7 @@
       </p:pic>
       <p:sp>
         <p:nvSpPr>
-          <p:cNvPr id="7" name="Title 1">
+          <p:cNvPr id="8" name="Title 1">
             <a:extLst>
               <a:ext uri="{FF2B5EF4-FFF2-40B4-BE49-F238E27FC236}">
                 <a16:creationId xmlns:a16="http://schemas.microsoft.com/office/drawing/2014/main" id="{2E48EEDE-6B7C-F048-B09C-D1002A57B0B8}"/>
@@ -4824,7 +4963,7 @@
         </p:nvSpPr>
         <p:spPr>
           <a:xfrm>
-            <a:off x="838200" y="100561"/>
+            <a:off x="847344" y="338305"/>
             <a:ext cx="10515600" cy="1325563"/>
           </a:xfrm>
         </p:spPr>
@@ -4833,7 +4972,11 @@
           <a:lstStyle/>
           <a:p>
             <a:r>
-              <a:rPr lang="en-GB" dirty="0"/>
+              <a:rPr lang="en-GB" dirty="0">
+                <a:solidFill>
+                  <a:schemeClr val="accent1"/>
+                </a:solidFill>
+              </a:rPr>
               <a:t>Common Spreadsheet errors</a:t>
             </a:r>
           </a:p>
@@ -4842,7 +4985,7 @@
     </p:spTree>
     <p:extLst>
       <p:ext uri="{BB962C8B-B14F-4D97-AF65-F5344CB8AC3E}">
-        <p14:creationId xmlns:p14="http://schemas.microsoft.com/office/powerpoint/2010/main" val="2293009819"/>
+        <p14:creationId xmlns:p14="http://schemas.microsoft.com/office/powerpoint/2010/main" val="2529286380"/>
       </p:ext>
     </p:extLst>
   </p:cSld>
@@ -4883,7 +5026,7 @@
         </p:nvSpPr>
         <p:spPr>
           <a:xfrm>
-            <a:off x="780832" y="1182161"/>
+            <a:off x="847344" y="1493057"/>
             <a:ext cx="6612428" cy="4524315"/>
           </a:xfrm>
           <a:prstGeom prst="rect">
@@ -4985,18 +5128,18 @@
                   <a:srgbClr val="0070C0"/>
                 </a:solidFill>
               </a:rPr>
-              <a:t>M30	=&gt; Male | 30</a:t>
+              <a:t>Male 30</a:t>
             </a:r>
           </a:p>
           <a:p>
             <a:pPr lvl="1"/>
             <a:r>
-              <a:rPr lang="pl-PL" sz="2000">
-                <a:solidFill>
-                  <a:srgbClr val="0070C0"/>
-                </a:solidFill>
-              </a:rPr>
-              <a:t>F28		=&gt; </a:t>
+              <a:rPr lang="pl-PL" sz="2000" dirty="0" err="1">
+                <a:solidFill>
+                  <a:srgbClr val="0070C0"/>
+                </a:solidFill>
+              </a:rPr>
+              <a:t>Female</a:t>
             </a:r>
             <a:r>
               <a:rPr lang="pl-PL" sz="2000" dirty="0">
@@ -5004,7 +5147,7 @@
                   <a:srgbClr val="0070C0"/>
                 </a:solidFill>
               </a:rPr>
-              <a:t>Female | 30</a:t>
+              <a:t> 28</a:t>
             </a:r>
           </a:p>
           <a:p>
@@ -5023,7 +5166,7 @@
                   <a:srgbClr val="0070C0"/>
                 </a:solidFill>
               </a:rPr>
-              <a:t>LD30C SUC	=&gt; LD | 30C | SUC</a:t>
+              <a:t>LD 30C SUC</a:t>
             </a:r>
           </a:p>
           <a:p>
@@ -5034,7 +5177,7 @@
                   <a:srgbClr val="0070C0"/>
                 </a:solidFill>
               </a:rPr>
-              <a:t>LD15C NO	=&gt; LD | 15C | NO</a:t>
+              <a:t>LD 15C NO</a:t>
             </a:r>
           </a:p>
           <a:p>
@@ -5045,7 +5188,7 @@
                   <a:srgbClr val="0070C0"/>
                 </a:solidFill>
               </a:rPr>
-              <a:t>SD30C NO	=&gt; SD | 30C | NO</a:t>
+              <a:t>SD 30C NO</a:t>
             </a:r>
           </a:p>
           <a:p>
@@ -5058,12 +5201,760 @@
           </a:p>
         </p:txBody>
       </p:sp>
-      <p:sp>
-        <p:nvSpPr>
-          <p:cNvPr id="7" name="Title 1">
-            <a:extLst>
-              <a:ext uri="{FF2B5EF4-FFF2-40B4-BE49-F238E27FC236}">
-                <a16:creationId xmlns:a16="http://schemas.microsoft.com/office/drawing/2014/main" id="{DE99D39D-7DF9-3346-9E54-14E25A2A8B09}"/>
+      <p:graphicFrame>
+        <p:nvGraphicFramePr>
+          <p:cNvPr id="2" name="Table 1"/>
+          <p:cNvGraphicFramePr>
+            <a:graphicFrameLocks noGrp="1"/>
+          </p:cNvGraphicFramePr>
+          <p:nvPr/>
+        </p:nvGraphicFramePr>
+        <p:xfrm>
+          <a:off x="4446574" y="3407742"/>
+          <a:ext cx="2716784" cy="1112520"/>
+        </p:xfrm>
+        <a:graphic>
+          <a:graphicData uri="http://schemas.openxmlformats.org/drawingml/2006/table">
+            <a:tbl>
+              <a:tblPr firstRow="1" bandRow="1">
+                <a:tableStyleId>{5940675A-B579-460E-94D1-54222C63F5DA}</a:tableStyleId>
+              </a:tblPr>
+              <a:tblGrid>
+                <a:gridCol w="1358392">
+                  <a:extLst>
+                    <a:ext uri="{9D8B030D-6E8A-4147-A177-3AD203B41FA5}">
+                      <a16:colId xmlns:a16="http://schemas.microsoft.com/office/drawing/2014/main" val="1654218153"/>
+                    </a:ext>
+                  </a:extLst>
+                </a:gridCol>
+                <a:gridCol w="1358392">
+                  <a:extLst>
+                    <a:ext uri="{9D8B030D-6E8A-4147-A177-3AD203B41FA5}">
+                      <a16:colId xmlns:a16="http://schemas.microsoft.com/office/drawing/2014/main" val="1813320277"/>
+                    </a:ext>
+                  </a:extLst>
+                </a:gridCol>
+              </a:tblGrid>
+              <a:tr h="370840">
+                <a:tc>
+                  <a:txBody>
+                    <a:bodyPr/>
+                    <a:lstStyle/>
+                    <a:p>
+                      <a:r>
+                        <a:rPr lang="en-GB" b="0" dirty="0">
+                          <a:solidFill>
+                            <a:srgbClr val="0070C0"/>
+                          </a:solidFill>
+                        </a:rPr>
+                        <a:t>Sex</a:t>
+                      </a:r>
+                    </a:p>
+                  </a:txBody>
+                  <a:tcPr/>
+                </a:tc>
+                <a:tc>
+                  <a:txBody>
+                    <a:bodyPr/>
+                    <a:lstStyle/>
+                    <a:p>
+                      <a:pPr marL="0" marR="0" lvl="0" indent="0" algn="l" defTabSz="914400" rtl="0" eaLnBrk="1" fontAlgn="auto" latinLnBrk="0" hangingPunct="1">
+                        <a:lnSpc>
+                          <a:spcPct val="100000"/>
+                        </a:lnSpc>
+                        <a:spcBef>
+                          <a:spcPts val="0"/>
+                        </a:spcBef>
+                        <a:spcAft>
+                          <a:spcPts val="0"/>
+                        </a:spcAft>
+                        <a:buClrTx/>
+                        <a:buSzTx/>
+                        <a:buFontTx/>
+                        <a:buNone/>
+                        <a:tabLst/>
+                        <a:defRPr/>
+                      </a:pPr>
+                      <a:r>
+                        <a:rPr lang="en-GB" sz="1800" dirty="0">
+                          <a:solidFill>
+                            <a:srgbClr val="0070C0"/>
+                          </a:solidFill>
+                        </a:rPr>
+                        <a:t>Age</a:t>
+                      </a:r>
+                      <a:endParaRPr lang="pl-PL" sz="1800" dirty="0">
+                        <a:solidFill>
+                          <a:srgbClr val="0070C0"/>
+                        </a:solidFill>
+                      </a:endParaRPr>
+                    </a:p>
+                  </a:txBody>
+                  <a:tcPr/>
+                </a:tc>
+                <a:extLst>
+                  <a:ext uri="{0D108BD9-81ED-4DB2-BD59-A6C34878D82A}">
+                    <a16:rowId xmlns:a16="http://schemas.microsoft.com/office/drawing/2014/main" val="4182604568"/>
+                  </a:ext>
+                </a:extLst>
+              </a:tr>
+              <a:tr h="370840">
+                <a:tc>
+                  <a:txBody>
+                    <a:bodyPr/>
+                    <a:lstStyle/>
+                    <a:p>
+                      <a:r>
+                        <a:rPr lang="pl-PL" sz="1800" dirty="0">
+                          <a:solidFill>
+                            <a:srgbClr val="0070C0"/>
+                          </a:solidFill>
+                        </a:rPr>
+                        <a:t>Male</a:t>
+                      </a:r>
+                      <a:endParaRPr lang="en-GB" b="1" dirty="0"/>
+                    </a:p>
+                  </a:txBody>
+                  <a:tcPr/>
+                </a:tc>
+                <a:tc>
+                  <a:txBody>
+                    <a:bodyPr/>
+                    <a:lstStyle/>
+                    <a:p>
+                      <a:pPr marL="0" marR="0" lvl="0" indent="0" algn="l" defTabSz="914400" rtl="0" eaLnBrk="1" fontAlgn="auto" latinLnBrk="0" hangingPunct="1">
+                        <a:lnSpc>
+                          <a:spcPct val="100000"/>
+                        </a:lnSpc>
+                        <a:spcBef>
+                          <a:spcPts val="0"/>
+                        </a:spcBef>
+                        <a:spcAft>
+                          <a:spcPts val="0"/>
+                        </a:spcAft>
+                        <a:buClrTx/>
+                        <a:buSzTx/>
+                        <a:buFontTx/>
+                        <a:buNone/>
+                        <a:tabLst/>
+                        <a:defRPr/>
+                      </a:pPr>
+                      <a:r>
+                        <a:rPr lang="pl-PL" sz="1800" dirty="0">
+                          <a:solidFill>
+                            <a:srgbClr val="0070C0"/>
+                          </a:solidFill>
+                        </a:rPr>
+                        <a:t>30</a:t>
+                      </a:r>
+                    </a:p>
+                  </a:txBody>
+                  <a:tcPr/>
+                </a:tc>
+                <a:extLst>
+                  <a:ext uri="{0D108BD9-81ED-4DB2-BD59-A6C34878D82A}">
+                    <a16:rowId xmlns:a16="http://schemas.microsoft.com/office/drawing/2014/main" val="3337981645"/>
+                  </a:ext>
+                </a:extLst>
+              </a:tr>
+              <a:tr h="370840">
+                <a:tc>
+                  <a:txBody>
+                    <a:bodyPr/>
+                    <a:lstStyle/>
+                    <a:p>
+                      <a:r>
+                        <a:rPr lang="pl-PL" sz="1800" dirty="0">
+                          <a:solidFill>
+                            <a:srgbClr val="0070C0"/>
+                          </a:solidFill>
+                        </a:rPr>
+                        <a:t>Female</a:t>
+                      </a:r>
+                      <a:endParaRPr lang="en-GB" dirty="0"/>
+                    </a:p>
+                  </a:txBody>
+                  <a:tcPr/>
+                </a:tc>
+                <a:tc>
+                  <a:txBody>
+                    <a:bodyPr/>
+                    <a:lstStyle/>
+                    <a:p>
+                      <a:pPr marL="0" marR="0" lvl="0" indent="0" algn="l" defTabSz="914400" rtl="0" eaLnBrk="1" fontAlgn="auto" latinLnBrk="0" hangingPunct="1">
+                        <a:lnSpc>
+                          <a:spcPct val="100000"/>
+                        </a:lnSpc>
+                        <a:spcBef>
+                          <a:spcPts val="0"/>
+                        </a:spcBef>
+                        <a:spcAft>
+                          <a:spcPts val="0"/>
+                        </a:spcAft>
+                        <a:buClrTx/>
+                        <a:buSzTx/>
+                        <a:buFontTx/>
+                        <a:buNone/>
+                        <a:tabLst/>
+                        <a:defRPr/>
+                      </a:pPr>
+                      <a:r>
+                        <a:rPr lang="pl-PL" sz="1800" dirty="0">
+                          <a:solidFill>
+                            <a:srgbClr val="0070C0"/>
+                          </a:solidFill>
+                        </a:rPr>
+                        <a:t>28</a:t>
+                      </a:r>
+                    </a:p>
+                  </a:txBody>
+                  <a:tcPr/>
+                </a:tc>
+                <a:extLst>
+                  <a:ext uri="{0D108BD9-81ED-4DB2-BD59-A6C34878D82A}">
+                    <a16:rowId xmlns:a16="http://schemas.microsoft.com/office/drawing/2014/main" val="3141620665"/>
+                  </a:ext>
+                </a:extLst>
+              </a:tr>
+            </a:tbl>
+          </a:graphicData>
+        </a:graphic>
+      </p:graphicFrame>
+      <p:graphicFrame>
+        <p:nvGraphicFramePr>
+          <p:cNvPr id="6" name="Table 5"/>
+          <p:cNvGraphicFramePr>
+            <a:graphicFrameLocks noGrp="1"/>
+          </p:cNvGraphicFramePr>
+          <p:nvPr/>
+        </p:nvGraphicFramePr>
+        <p:xfrm>
+          <a:off x="4272752" y="4836814"/>
+          <a:ext cx="4178808" cy="1752600"/>
+        </p:xfrm>
+        <a:graphic>
+          <a:graphicData uri="http://schemas.openxmlformats.org/drawingml/2006/table">
+            <a:tbl>
+              <a:tblPr firstRow="1" bandRow="1">
+                <a:tableStyleId>{5940675A-B579-460E-94D1-54222C63F5DA}</a:tableStyleId>
+              </a:tblPr>
+              <a:tblGrid>
+                <a:gridCol w="1758099">
+                  <a:extLst>
+                    <a:ext uri="{9D8B030D-6E8A-4147-A177-3AD203B41FA5}">
+                      <a16:colId xmlns:a16="http://schemas.microsoft.com/office/drawing/2014/main" val="1654218153"/>
+                    </a:ext>
+                  </a:extLst>
+                </a:gridCol>
+                <a:gridCol w="1027773">
+                  <a:extLst>
+                    <a:ext uri="{9D8B030D-6E8A-4147-A177-3AD203B41FA5}">
+                      <a16:colId xmlns:a16="http://schemas.microsoft.com/office/drawing/2014/main" val="1813320277"/>
+                    </a:ext>
+                  </a:extLst>
+                </a:gridCol>
+                <a:gridCol w="1392936">
+                  <a:extLst>
+                    <a:ext uri="{9D8B030D-6E8A-4147-A177-3AD203B41FA5}">
+                      <a16:colId xmlns:a16="http://schemas.microsoft.com/office/drawing/2014/main" val="3686260757"/>
+                    </a:ext>
+                  </a:extLst>
+                </a:gridCol>
+              </a:tblGrid>
+              <a:tr h="370840">
+                <a:tc>
+                  <a:txBody>
+                    <a:bodyPr/>
+                    <a:lstStyle/>
+                    <a:p>
+                      <a:r>
+                        <a:rPr lang="en-GB" b="0" dirty="0" err="1">
+                          <a:solidFill>
+                            <a:srgbClr val="0070C0"/>
+                          </a:solidFill>
+                        </a:rPr>
+                        <a:t>Day_length</a:t>
+                      </a:r>
+                      <a:endParaRPr lang="en-GB" b="0" dirty="0">
+                        <a:solidFill>
+                          <a:srgbClr val="0070C0"/>
+                        </a:solidFill>
+                      </a:endParaRPr>
+                    </a:p>
+                  </a:txBody>
+                  <a:tcPr/>
+                </a:tc>
+                <a:tc>
+                  <a:txBody>
+                    <a:bodyPr/>
+                    <a:lstStyle/>
+                    <a:p>
+                      <a:pPr marL="0" marR="0" lvl="0" indent="0" algn="l" defTabSz="914400" rtl="0" eaLnBrk="1" fontAlgn="auto" latinLnBrk="0" hangingPunct="1">
+                        <a:lnSpc>
+                          <a:spcPct val="100000"/>
+                        </a:lnSpc>
+                        <a:spcBef>
+                          <a:spcPts val="0"/>
+                        </a:spcBef>
+                        <a:spcAft>
+                          <a:spcPts val="0"/>
+                        </a:spcAft>
+                        <a:buClrTx/>
+                        <a:buSzTx/>
+                        <a:buFontTx/>
+                        <a:buNone/>
+                        <a:tabLst/>
+                        <a:defRPr/>
+                      </a:pPr>
+                      <a:r>
+                        <a:rPr lang="en-GB" sz="1800" dirty="0" err="1">
+                          <a:solidFill>
+                            <a:srgbClr val="0070C0"/>
+                          </a:solidFill>
+                        </a:rPr>
+                        <a:t>Temp_C</a:t>
+                      </a:r>
+                      <a:endParaRPr lang="pl-PL" sz="1800" dirty="0">
+                        <a:solidFill>
+                          <a:srgbClr val="0070C0"/>
+                        </a:solidFill>
+                      </a:endParaRPr>
+                    </a:p>
+                  </a:txBody>
+                  <a:tcPr/>
+                </a:tc>
+                <a:tc>
+                  <a:txBody>
+                    <a:bodyPr/>
+                    <a:lstStyle/>
+                    <a:p>
+                      <a:pPr marL="0" marR="0" lvl="0" indent="0" algn="l" defTabSz="914400" rtl="0" eaLnBrk="1" fontAlgn="auto" latinLnBrk="0" hangingPunct="1">
+                        <a:lnSpc>
+                          <a:spcPct val="100000"/>
+                        </a:lnSpc>
+                        <a:spcBef>
+                          <a:spcPts val="0"/>
+                        </a:spcBef>
+                        <a:spcAft>
+                          <a:spcPts val="0"/>
+                        </a:spcAft>
+                        <a:buClrTx/>
+                        <a:buSzTx/>
+                        <a:buFontTx/>
+                        <a:buNone/>
+                        <a:tabLst/>
+                        <a:defRPr/>
+                      </a:pPr>
+                      <a:r>
+                        <a:rPr lang="en-GB" sz="1800" dirty="0">
+                          <a:solidFill>
+                            <a:srgbClr val="0070C0"/>
+                          </a:solidFill>
+                        </a:rPr>
+                        <a:t>Added_ Sucrose</a:t>
+                      </a:r>
+                      <a:endParaRPr lang="pl-PL" sz="1800" dirty="0">
+                        <a:solidFill>
+                          <a:srgbClr val="0070C0"/>
+                        </a:solidFill>
+                      </a:endParaRPr>
+                    </a:p>
+                  </a:txBody>
+                  <a:tcPr/>
+                </a:tc>
+                <a:extLst>
+                  <a:ext uri="{0D108BD9-81ED-4DB2-BD59-A6C34878D82A}">
+                    <a16:rowId xmlns:a16="http://schemas.microsoft.com/office/drawing/2014/main" val="2945303802"/>
+                  </a:ext>
+                </a:extLst>
+              </a:tr>
+              <a:tr h="370840">
+                <a:tc>
+                  <a:txBody>
+                    <a:bodyPr/>
+                    <a:lstStyle/>
+                    <a:p>
+                      <a:r>
+                        <a:rPr lang="en-GB" sz="1800" dirty="0">
+                          <a:solidFill>
+                            <a:srgbClr val="0070C0"/>
+                          </a:solidFill>
+                        </a:rPr>
+                        <a:t>LD</a:t>
+                      </a:r>
+                      <a:endParaRPr lang="en-GB" b="1" dirty="0">
+                        <a:solidFill>
+                          <a:srgbClr val="0070C0"/>
+                        </a:solidFill>
+                      </a:endParaRPr>
+                    </a:p>
+                  </a:txBody>
+                  <a:tcPr/>
+                </a:tc>
+                <a:tc>
+                  <a:txBody>
+                    <a:bodyPr/>
+                    <a:lstStyle/>
+                    <a:p>
+                      <a:pPr marL="0" marR="0" lvl="0" indent="0" algn="l" defTabSz="914400" rtl="0" eaLnBrk="1" fontAlgn="auto" latinLnBrk="0" hangingPunct="1">
+                        <a:lnSpc>
+                          <a:spcPct val="100000"/>
+                        </a:lnSpc>
+                        <a:spcBef>
+                          <a:spcPts val="0"/>
+                        </a:spcBef>
+                        <a:spcAft>
+                          <a:spcPts val="0"/>
+                        </a:spcAft>
+                        <a:buClrTx/>
+                        <a:buSzTx/>
+                        <a:buFontTx/>
+                        <a:buNone/>
+                        <a:tabLst/>
+                        <a:defRPr/>
+                      </a:pPr>
+                      <a:r>
+                        <a:rPr lang="pl-PL" sz="1800" dirty="0">
+                          <a:solidFill>
+                            <a:srgbClr val="0070C0"/>
+                          </a:solidFill>
+                        </a:rPr>
+                        <a:t>30</a:t>
+                      </a:r>
+                    </a:p>
+                  </a:txBody>
+                  <a:tcPr/>
+                </a:tc>
+                <a:tc>
+                  <a:txBody>
+                    <a:bodyPr/>
+                    <a:lstStyle/>
+                    <a:p>
+                      <a:pPr marL="0" marR="0" lvl="0" indent="0" algn="l" defTabSz="914400" rtl="0" eaLnBrk="1" fontAlgn="auto" latinLnBrk="0" hangingPunct="1">
+                        <a:lnSpc>
+                          <a:spcPct val="100000"/>
+                        </a:lnSpc>
+                        <a:spcBef>
+                          <a:spcPts val="0"/>
+                        </a:spcBef>
+                        <a:spcAft>
+                          <a:spcPts val="0"/>
+                        </a:spcAft>
+                        <a:buClrTx/>
+                        <a:buSzTx/>
+                        <a:buFontTx/>
+                        <a:buNone/>
+                        <a:tabLst/>
+                        <a:defRPr/>
+                      </a:pPr>
+                      <a:r>
+                        <a:rPr lang="en-GB" sz="1800" dirty="0">
+                          <a:solidFill>
+                            <a:srgbClr val="0070C0"/>
+                          </a:solidFill>
+                        </a:rPr>
+                        <a:t>YES</a:t>
+                      </a:r>
+                      <a:endParaRPr lang="pl-PL" sz="1800" dirty="0">
+                        <a:solidFill>
+                          <a:srgbClr val="0070C0"/>
+                        </a:solidFill>
+                      </a:endParaRPr>
+                    </a:p>
+                  </a:txBody>
+                  <a:tcPr/>
+                </a:tc>
+                <a:extLst>
+                  <a:ext uri="{0D108BD9-81ED-4DB2-BD59-A6C34878D82A}">
+                    <a16:rowId xmlns:a16="http://schemas.microsoft.com/office/drawing/2014/main" val="3337981645"/>
+                  </a:ext>
+                </a:extLst>
+              </a:tr>
+              <a:tr h="370840">
+                <a:tc>
+                  <a:txBody>
+                    <a:bodyPr/>
+                    <a:lstStyle/>
+                    <a:p>
+                      <a:r>
+                        <a:rPr lang="en-GB" sz="1800" dirty="0">
+                          <a:solidFill>
+                            <a:srgbClr val="0070C0"/>
+                          </a:solidFill>
+                        </a:rPr>
+                        <a:t>SD</a:t>
+                      </a:r>
+                      <a:endParaRPr lang="en-GB" dirty="0">
+                        <a:solidFill>
+                          <a:srgbClr val="0070C0"/>
+                        </a:solidFill>
+                      </a:endParaRPr>
+                    </a:p>
+                  </a:txBody>
+                  <a:tcPr/>
+                </a:tc>
+                <a:tc>
+                  <a:txBody>
+                    <a:bodyPr/>
+                    <a:lstStyle/>
+                    <a:p>
+                      <a:pPr marL="0" marR="0" lvl="0" indent="0" algn="l" defTabSz="914400" rtl="0" eaLnBrk="1" fontAlgn="auto" latinLnBrk="0" hangingPunct="1">
+                        <a:lnSpc>
+                          <a:spcPct val="100000"/>
+                        </a:lnSpc>
+                        <a:spcBef>
+                          <a:spcPts val="0"/>
+                        </a:spcBef>
+                        <a:spcAft>
+                          <a:spcPts val="0"/>
+                        </a:spcAft>
+                        <a:buClrTx/>
+                        <a:buSzTx/>
+                        <a:buFontTx/>
+                        <a:buNone/>
+                        <a:tabLst/>
+                        <a:defRPr/>
+                      </a:pPr>
+                      <a:r>
+                        <a:rPr lang="en-GB" sz="1800" dirty="0">
+                          <a:solidFill>
+                            <a:srgbClr val="0070C0"/>
+                          </a:solidFill>
+                        </a:rPr>
+                        <a:t>15</a:t>
+                      </a:r>
+                      <a:endParaRPr lang="pl-PL" sz="1800" dirty="0">
+                        <a:solidFill>
+                          <a:srgbClr val="0070C0"/>
+                        </a:solidFill>
+                      </a:endParaRPr>
+                    </a:p>
+                  </a:txBody>
+                  <a:tcPr/>
+                </a:tc>
+                <a:tc>
+                  <a:txBody>
+                    <a:bodyPr/>
+                    <a:lstStyle/>
+                    <a:p>
+                      <a:pPr marL="0" marR="0" lvl="0" indent="0" algn="l" defTabSz="914400" rtl="0" eaLnBrk="1" fontAlgn="auto" latinLnBrk="0" hangingPunct="1">
+                        <a:lnSpc>
+                          <a:spcPct val="100000"/>
+                        </a:lnSpc>
+                        <a:spcBef>
+                          <a:spcPts val="0"/>
+                        </a:spcBef>
+                        <a:spcAft>
+                          <a:spcPts val="0"/>
+                        </a:spcAft>
+                        <a:buClrTx/>
+                        <a:buSzTx/>
+                        <a:buFontTx/>
+                        <a:buNone/>
+                        <a:tabLst/>
+                        <a:defRPr/>
+                      </a:pPr>
+                      <a:r>
+                        <a:rPr lang="en-GB" sz="1800" dirty="0">
+                          <a:solidFill>
+                            <a:srgbClr val="0070C0"/>
+                          </a:solidFill>
+                        </a:rPr>
+                        <a:t>NO</a:t>
+                      </a:r>
+                      <a:endParaRPr lang="pl-PL" sz="1800" dirty="0">
+                        <a:solidFill>
+                          <a:srgbClr val="0070C0"/>
+                        </a:solidFill>
+                      </a:endParaRPr>
+                    </a:p>
+                  </a:txBody>
+                  <a:tcPr/>
+                </a:tc>
+                <a:extLst>
+                  <a:ext uri="{0D108BD9-81ED-4DB2-BD59-A6C34878D82A}">
+                    <a16:rowId xmlns:a16="http://schemas.microsoft.com/office/drawing/2014/main" val="3141620665"/>
+                  </a:ext>
+                </a:extLst>
+              </a:tr>
+              <a:tr h="370840">
+                <a:tc>
+                  <a:txBody>
+                    <a:bodyPr/>
+                    <a:lstStyle/>
+                    <a:p>
+                      <a:r>
+                        <a:rPr lang="en-GB" dirty="0">
+                          <a:solidFill>
+                            <a:srgbClr val="0070C0"/>
+                          </a:solidFill>
+                        </a:rPr>
+                        <a:t>SD</a:t>
+                      </a:r>
+                    </a:p>
+                  </a:txBody>
+                  <a:tcPr/>
+                </a:tc>
+                <a:tc>
+                  <a:txBody>
+                    <a:bodyPr/>
+                    <a:lstStyle/>
+                    <a:p>
+                      <a:pPr marL="0" marR="0" lvl="0" indent="0" algn="l" defTabSz="914400" rtl="0" eaLnBrk="1" fontAlgn="auto" latinLnBrk="0" hangingPunct="1">
+                        <a:lnSpc>
+                          <a:spcPct val="100000"/>
+                        </a:lnSpc>
+                        <a:spcBef>
+                          <a:spcPts val="0"/>
+                        </a:spcBef>
+                        <a:spcAft>
+                          <a:spcPts val="0"/>
+                        </a:spcAft>
+                        <a:buClrTx/>
+                        <a:buSzTx/>
+                        <a:buFontTx/>
+                        <a:buNone/>
+                        <a:tabLst/>
+                        <a:defRPr/>
+                      </a:pPr>
+                      <a:r>
+                        <a:rPr lang="en-GB" sz="1800" dirty="0">
+                          <a:solidFill>
+                            <a:srgbClr val="0070C0"/>
+                          </a:solidFill>
+                        </a:rPr>
+                        <a:t>30</a:t>
+                      </a:r>
+                      <a:endParaRPr lang="pl-PL" sz="1800" dirty="0">
+                        <a:solidFill>
+                          <a:srgbClr val="0070C0"/>
+                        </a:solidFill>
+                      </a:endParaRPr>
+                    </a:p>
+                  </a:txBody>
+                  <a:tcPr/>
+                </a:tc>
+                <a:tc>
+                  <a:txBody>
+                    <a:bodyPr/>
+                    <a:lstStyle/>
+                    <a:p>
+                      <a:pPr marL="0" marR="0" lvl="0" indent="0" algn="l" defTabSz="914400" rtl="0" eaLnBrk="1" fontAlgn="auto" latinLnBrk="0" hangingPunct="1">
+                        <a:lnSpc>
+                          <a:spcPct val="100000"/>
+                        </a:lnSpc>
+                        <a:spcBef>
+                          <a:spcPts val="0"/>
+                        </a:spcBef>
+                        <a:spcAft>
+                          <a:spcPts val="0"/>
+                        </a:spcAft>
+                        <a:buClrTx/>
+                        <a:buSzTx/>
+                        <a:buFontTx/>
+                        <a:buNone/>
+                        <a:tabLst/>
+                        <a:defRPr/>
+                      </a:pPr>
+                      <a:r>
+                        <a:rPr lang="en-GB" sz="1800" dirty="0">
+                          <a:solidFill>
+                            <a:srgbClr val="0070C0"/>
+                          </a:solidFill>
+                        </a:rPr>
+                        <a:t>NO</a:t>
+                      </a:r>
+                      <a:endParaRPr lang="pl-PL" sz="1800" dirty="0">
+                        <a:solidFill>
+                          <a:srgbClr val="0070C0"/>
+                        </a:solidFill>
+                      </a:endParaRPr>
+                    </a:p>
+                  </a:txBody>
+                  <a:tcPr/>
+                </a:tc>
+                <a:extLst>
+                  <a:ext uri="{0D108BD9-81ED-4DB2-BD59-A6C34878D82A}">
+                    <a16:rowId xmlns:a16="http://schemas.microsoft.com/office/drawing/2014/main" val="3921019110"/>
+                  </a:ext>
+                </a:extLst>
+              </a:tr>
+            </a:tbl>
+          </a:graphicData>
+        </a:graphic>
+      </p:graphicFrame>
+      <p:cxnSp>
+        <p:nvCxnSpPr>
+          <p:cNvPr id="4" name="Straight Arrow Connector 3"/>
+          <p:cNvCxnSpPr/>
+          <p:nvPr/>
+        </p:nvCxnSpPr>
+        <p:spPr>
+          <a:xfrm>
+            <a:off x="3175472" y="4059936"/>
+            <a:ext cx="649224" cy="0"/>
+          </a:xfrm>
+          <a:prstGeom prst="straightConnector1">
+            <a:avLst/>
+          </a:prstGeom>
+          <a:ln>
+            <a:tailEnd type="triangle"/>
+          </a:ln>
+        </p:spPr>
+        <p:style>
+          <a:lnRef idx="1">
+            <a:schemeClr val="accent1"/>
+          </a:lnRef>
+          <a:fillRef idx="0">
+            <a:schemeClr val="accent1"/>
+          </a:fillRef>
+          <a:effectRef idx="0">
+            <a:schemeClr val="accent1"/>
+          </a:effectRef>
+          <a:fontRef idx="minor">
+            <a:schemeClr val="tx1"/>
+          </a:fontRef>
+        </p:style>
+      </p:cxnSp>
+      <p:cxnSp>
+        <p:nvCxnSpPr>
+          <p:cNvPr id="8" name="Straight Arrow Connector 7"/>
+          <p:cNvCxnSpPr/>
+          <p:nvPr/>
+        </p:nvCxnSpPr>
+        <p:spPr>
+          <a:xfrm>
+            <a:off x="2850860" y="5273040"/>
+            <a:ext cx="649224" cy="0"/>
+          </a:xfrm>
+          <a:prstGeom prst="straightConnector1">
+            <a:avLst/>
+          </a:prstGeom>
+          <a:ln>
+            <a:tailEnd type="triangle"/>
+          </a:ln>
+        </p:spPr>
+        <p:style>
+          <a:lnRef idx="1">
+            <a:schemeClr val="accent1"/>
+          </a:lnRef>
+          <a:fillRef idx="0">
+            <a:schemeClr val="accent1"/>
+          </a:fillRef>
+          <a:effectRef idx="0">
+            <a:schemeClr val="accent1"/>
+          </a:effectRef>
+          <a:fontRef idx="minor">
+            <a:schemeClr val="tx1"/>
+          </a:fontRef>
+        </p:style>
+      </p:cxnSp>
+      <p:sp>
+        <p:nvSpPr>
+          <p:cNvPr id="9" name="Title 1">
+            <a:extLst>
+              <a:ext uri="{FF2B5EF4-FFF2-40B4-BE49-F238E27FC236}">
+                <a16:creationId xmlns:a16="http://schemas.microsoft.com/office/drawing/2014/main" id="{2E48EEDE-6B7C-F048-B09C-D1002A57B0B8}"/>
               </a:ext>
             </a:extLst>
           </p:cNvPr>
@@ -5076,7 +5967,7 @@
         </p:nvSpPr>
         <p:spPr>
           <a:xfrm>
-            <a:off x="838200" y="100561"/>
+            <a:off x="847344" y="338305"/>
             <a:ext cx="10515600" cy="1325563"/>
           </a:xfrm>
         </p:spPr>
@@ -5085,7 +5976,11 @@
           <a:lstStyle/>
           <a:p>
             <a:r>
-              <a:rPr lang="en-GB" dirty="0"/>
+              <a:rPr lang="en-GB" dirty="0">
+                <a:solidFill>
+                  <a:schemeClr val="accent1"/>
+                </a:solidFill>
+              </a:rPr>
               <a:t>Common Spreadsheet errors</a:t>
             </a:r>
           </a:p>
@@ -5094,7 +5989,7 @@
     </p:spTree>
     <p:extLst>
       <p:ext uri="{BB962C8B-B14F-4D97-AF65-F5344CB8AC3E}">
-        <p14:creationId xmlns:p14="http://schemas.microsoft.com/office/powerpoint/2010/main" val="3132193714"/>
+        <p14:creationId xmlns:p14="http://schemas.microsoft.com/office/powerpoint/2010/main" val="2569062314"/>
       </p:ext>
     </p:extLst>
   </p:cSld>
@@ -5135,8 +6030,8 @@
         </p:nvSpPr>
         <p:spPr>
           <a:xfrm>
-            <a:off x="780832" y="1182161"/>
-            <a:ext cx="6612428" cy="4216539"/>
+            <a:off x="661960" y="1749089"/>
+            <a:ext cx="6186896" cy="3477875"/>
           </a:xfrm>
           <a:prstGeom prst="rect">
             <a:avLst/>
@@ -5170,7 +6065,7 @@
                   <a:srgbClr val="0070C0"/>
                 </a:solidFill>
               </a:rPr>
-              <a:t>Be consistent!</a:t>
+              <a:t>Be consistent and try to use a formal naming system defined in your field.</a:t>
             </a:r>
             <a:endParaRPr lang="pl-PL" sz="2000" dirty="0">
               <a:solidFill>
@@ -5188,22 +6083,58 @@
           </a:p>
           <a:p>
             <a:pPr lvl="1"/>
-            <a:r>
-              <a:rPr lang="it-IT" sz="2400" dirty="0">
-                <a:solidFill>
-                  <a:srgbClr val="0070C0"/>
-                </a:solidFill>
-              </a:rPr>
-              <a:t>E. Coli, EColi, Escherichia coli </a:t>
-            </a:r>
-          </a:p>
-          <a:p>
-            <a:pPr lvl="1"/>
             <a:endParaRPr lang="en-GB" sz="2400" dirty="0">
               <a:solidFill>
                 <a:srgbClr val="0070C0"/>
               </a:solidFill>
             </a:endParaRPr>
+          </a:p>
+          <a:p>
+            <a:endParaRPr lang="pl-PL" sz="2400" dirty="0">
+              <a:solidFill>
+                <a:srgbClr val="0070C0"/>
+              </a:solidFill>
+            </a:endParaRPr>
+          </a:p>
+          <a:p>
+            <a:pPr marL="457200" indent="-457200">
+              <a:buFont typeface="Arial" panose="020B0604020202020204" pitchFamily="34" charset="0"/>
+              <a:buChar char="•"/>
+            </a:pPr>
+            <a:r>
+              <a:rPr lang="en-GB" sz="2400" dirty="0">
+                <a:solidFill>
+                  <a:srgbClr val="0070C0"/>
+                </a:solidFill>
+              </a:rPr>
+              <a:t>Using problematic field names</a:t>
+            </a:r>
+          </a:p>
+          <a:p>
+            <a:pPr lvl="1"/>
+            <a:r>
+              <a:rPr lang="en-GB" sz="2000" dirty="0">
+                <a:solidFill>
+                  <a:srgbClr val="0070C0"/>
+                </a:solidFill>
+              </a:rPr>
+              <a:t>Underscores not spaces. Avoid abbreviations. </a:t>
+            </a:r>
+            <a:br>
+              <a:rPr lang="en-GB" sz="2000" dirty="0">
+                <a:solidFill>
+                  <a:srgbClr val="0070C0"/>
+                </a:solidFill>
+              </a:rPr>
+            </a:br>
+            <a:r>
+              <a:rPr lang="en-GB" sz="2000" dirty="0">
+                <a:solidFill>
+                  <a:srgbClr val="0070C0"/>
+                </a:solidFill>
+              </a:rPr>
+              <a:t>Include units.</a:t>
+            </a:r>
           </a:p>
           <a:p>
             <a:pPr marL="457200" indent="-457200">
@@ -5216,134 +6147,6 @@
               </a:solidFill>
             </a:endParaRPr>
           </a:p>
-          <a:p>
-            <a:pPr marL="457200" indent="-457200">
-              <a:buFont typeface="Arial" panose="020B0604020202020204" pitchFamily="34" charset="0"/>
-              <a:buChar char="•"/>
-            </a:pPr>
-            <a:r>
-              <a:rPr lang="en-GB" sz="2400" dirty="0">
-                <a:solidFill>
-                  <a:srgbClr val="0070C0"/>
-                </a:solidFill>
-              </a:rPr>
-              <a:t>Using problematic field</a:t>
-            </a:r>
-            <a:r>
-              <a:rPr lang="pl-PL" sz="2400" dirty="0">
-                <a:solidFill>
-                  <a:srgbClr val="0070C0"/>
-                </a:solidFill>
-              </a:rPr>
-              <a:t>/column</a:t>
-            </a:r>
-            <a:r>
-              <a:rPr lang="en-GB" sz="2400" dirty="0">
-                <a:solidFill>
-                  <a:srgbClr val="0070C0"/>
-                </a:solidFill>
-              </a:rPr>
-              <a:t> names</a:t>
-            </a:r>
-          </a:p>
-          <a:p>
-            <a:pPr lvl="1"/>
-            <a:r>
-              <a:rPr lang="en-GB" sz="2000" dirty="0">
-                <a:solidFill>
-                  <a:srgbClr val="0070C0"/>
-                </a:solidFill>
-              </a:rPr>
-              <a:t>Underscores not spaces. Avoid abbreviations. </a:t>
-            </a:r>
-            <a:br>
-              <a:rPr lang="en-GB" sz="2000" dirty="0">
-                <a:solidFill>
-                  <a:srgbClr val="0070C0"/>
-                </a:solidFill>
-              </a:rPr>
-            </a:br>
-            <a:r>
-              <a:rPr lang="en-GB" sz="2000" dirty="0">
-                <a:solidFill>
-                  <a:srgbClr val="0070C0"/>
-                </a:solidFill>
-              </a:rPr>
-              <a:t>Include units.</a:t>
-            </a:r>
-            <a:endParaRPr lang="pl-PL" sz="2000" dirty="0">
-              <a:solidFill>
-                <a:srgbClr val="0070C0"/>
-              </a:solidFill>
-            </a:endParaRPr>
-          </a:p>
-          <a:p>
-            <a:pPr lvl="1"/>
-            <a:endParaRPr lang="pl-PL" sz="2000" dirty="0">
-              <a:solidFill>
-                <a:srgbClr val="0070C0"/>
-              </a:solidFill>
-            </a:endParaRPr>
-          </a:p>
-          <a:p>
-            <a:pPr lvl="1"/>
-            <a:r>
-              <a:rPr lang="pl-PL" sz="2000" dirty="0">
-                <a:solidFill>
-                  <a:srgbClr val="0070C0"/>
-                </a:solidFill>
-              </a:rPr>
-              <a:t>It easier to process data in R/Python if</a:t>
-            </a:r>
-            <a:br>
-              <a:rPr lang="pl-PL" sz="2000" dirty="0">
-                <a:solidFill>
-                  <a:srgbClr val="0070C0"/>
-                </a:solidFill>
-              </a:rPr>
-            </a:br>
-            <a:r>
-              <a:rPr lang="pl-PL" sz="2000" dirty="0">
-                <a:solidFill>
-                  <a:srgbClr val="0070C0"/>
-                </a:solidFill>
-              </a:rPr>
-              <a:t>there no spacec in columns headers</a:t>
-            </a:r>
-          </a:p>
-        </p:txBody>
-      </p:sp>
-      <p:sp>
-        <p:nvSpPr>
-          <p:cNvPr id="7" name="Title 1">
-            <a:extLst>
-              <a:ext uri="{FF2B5EF4-FFF2-40B4-BE49-F238E27FC236}">
-                <a16:creationId xmlns:a16="http://schemas.microsoft.com/office/drawing/2014/main" id="{DE99D39D-7DF9-3346-9E54-14E25A2A8B09}"/>
-              </a:ext>
-            </a:extLst>
-          </p:cNvPr>
-          <p:cNvSpPr>
-            <a:spLocks noGrp="1"/>
-          </p:cNvSpPr>
-          <p:nvPr>
-            <p:ph type="title"/>
-          </p:nvPr>
-        </p:nvSpPr>
-        <p:spPr>
-          <a:xfrm>
-            <a:off x="838200" y="100561"/>
-            <a:ext cx="10515600" cy="1325563"/>
-          </a:xfrm>
-        </p:spPr>
-        <p:txBody>
-          <a:bodyPr/>
-          <a:lstStyle/>
-          <a:p>
-            <a:r>
-              <a:rPr lang="en-GB" dirty="0"/>
-              <a:t>Common Spreadsheet errors</a:t>
-            </a:r>
-          </a:p>
         </p:txBody>
       </p:sp>
       <p:graphicFrame>
@@ -5358,16 +6161,10 @@
           <p:cNvGraphicFramePr>
             <a:graphicFrameLocks noGrp="1"/>
           </p:cNvGraphicFramePr>
-          <p:nvPr>
-            <p:extLst>
-              <p:ext uri="{D42A27DB-BD31-4B8C-83A1-F6EECF244321}">
-                <p14:modId xmlns:p14="http://schemas.microsoft.com/office/powerpoint/2010/main" val="1349781821"/>
-              </p:ext>
-            </p:extLst>
-          </p:nvPr>
+          <p:nvPr/>
         </p:nvGraphicFramePr>
         <p:xfrm>
-          <a:off x="6593189" y="2812580"/>
+          <a:off x="6321806" y="3891572"/>
           <a:ext cx="5041138" cy="2621280"/>
         </p:xfrm>
         <a:graphic>
@@ -5873,10 +6670,75 @@
           </a:graphicData>
         </a:graphic>
       </p:graphicFrame>
+      <p:sp>
+        <p:nvSpPr>
+          <p:cNvPr id="8" name="Title 1">
+            <a:extLst>
+              <a:ext uri="{FF2B5EF4-FFF2-40B4-BE49-F238E27FC236}">
+                <a16:creationId xmlns:a16="http://schemas.microsoft.com/office/drawing/2014/main" id="{2E48EEDE-6B7C-F048-B09C-D1002A57B0B8}"/>
+              </a:ext>
+            </a:extLst>
+          </p:cNvPr>
+          <p:cNvSpPr>
+            <a:spLocks noGrp="1"/>
+          </p:cNvSpPr>
+          <p:nvPr>
+            <p:ph type="title"/>
+          </p:nvPr>
+        </p:nvSpPr>
+        <p:spPr>
+          <a:xfrm>
+            <a:off x="847344" y="338305"/>
+            <a:ext cx="10515600" cy="1325563"/>
+          </a:xfrm>
+        </p:spPr>
+        <p:txBody>
+          <a:bodyPr/>
+          <a:lstStyle/>
+          <a:p>
+            <a:r>
+              <a:rPr lang="en-GB" dirty="0">
+                <a:solidFill>
+                  <a:schemeClr val="accent1"/>
+                </a:solidFill>
+              </a:rPr>
+              <a:t>Common Spreadsheet errors</a:t>
+            </a:r>
+          </a:p>
+        </p:txBody>
+      </p:sp>
+      <p:sp>
+        <p:nvSpPr>
+          <p:cNvPr id="3" name="Rectangle 2"/>
+          <p:cNvSpPr/>
+          <p:nvPr/>
+        </p:nvSpPr>
+        <p:spPr>
+          <a:xfrm>
+            <a:off x="7368662" y="2220166"/>
+            <a:ext cx="3225242" cy="400110"/>
+          </a:xfrm>
+          <a:prstGeom prst="rect">
+            <a:avLst/>
+          </a:prstGeom>
+        </p:spPr>
+        <p:txBody>
+          <a:bodyPr wrap="none">
+            <a:spAutoFit/>
+          </a:bodyPr>
+          <a:lstStyle/>
+          <a:p>
+            <a:r>
+              <a:rPr lang="it-IT" sz="2000" dirty="0"/>
+              <a:t>E. Coli, EColi, Escherichia coli </a:t>
+            </a:r>
+          </a:p>
+        </p:txBody>
+      </p:sp>
     </p:spTree>
     <p:extLst>
       <p:ext uri="{BB962C8B-B14F-4D97-AF65-F5344CB8AC3E}">
-        <p14:creationId xmlns:p14="http://schemas.microsoft.com/office/powerpoint/2010/main" val="2108067098"/>
+        <p14:creationId xmlns:p14="http://schemas.microsoft.com/office/powerpoint/2010/main" val="1512079429"/>
       </p:ext>
     </p:extLst>
   </p:cSld>
@@ -5952,26 +6814,18 @@
                   <a:srgbClr val="0070C0"/>
                 </a:solidFill>
               </a:rPr>
-              <a:t>Using special characters in data</a:t>
+              <a:t>Using special characters in data </a:t>
             </a:r>
           </a:p>
           <a:p>
             <a:pPr lvl="1"/>
             <a:r>
-              <a:rPr lang="pl-PL" sz="2000" dirty="0">
-                <a:solidFill>
-                  <a:srgbClr val="0070C0"/>
-                </a:solidFill>
-              </a:rPr>
-              <a:t>Programs still</a:t>
-            </a:r>
-            <a:r>
               <a:rPr lang="en-GB" sz="2000" dirty="0">
                 <a:solidFill>
                   <a:srgbClr val="0070C0"/>
                 </a:solidFill>
               </a:rPr>
-              <a:t> struggle with these</a:t>
+              <a:t>Computers struggle with these</a:t>
             </a:r>
             <a:endParaRPr lang="pl-PL" sz="2000" dirty="0">
               <a:solidFill>
@@ -6013,10 +6867,443 @@
       </p:sp>
       <p:sp>
         <p:nvSpPr>
-          <p:cNvPr id="7" name="Title 1">
-            <a:extLst>
-              <a:ext uri="{FF2B5EF4-FFF2-40B4-BE49-F238E27FC236}">
-                <a16:creationId xmlns:a16="http://schemas.microsoft.com/office/drawing/2014/main" id="{DE99D39D-7DF9-3346-9E54-14E25A2A8B09}"/>
+          <p:cNvPr id="4" name="Curved Right Arrow 3"/>
+          <p:cNvSpPr/>
+          <p:nvPr/>
+        </p:nvSpPr>
+        <p:spPr>
+          <a:xfrm>
+            <a:off x="1837944" y="4221860"/>
+            <a:ext cx="522922" cy="999364"/>
+          </a:xfrm>
+          <a:prstGeom prst="curvedRightArrow">
+            <a:avLst/>
+          </a:prstGeom>
+        </p:spPr>
+        <p:style>
+          <a:lnRef idx="2">
+            <a:schemeClr val="accent1">
+              <a:shade val="50000"/>
+            </a:schemeClr>
+          </a:lnRef>
+          <a:fillRef idx="1">
+            <a:schemeClr val="accent1"/>
+          </a:fillRef>
+          <a:effectRef idx="0">
+            <a:schemeClr val="accent1"/>
+          </a:effectRef>
+          <a:fontRef idx="minor">
+            <a:schemeClr val="lt1"/>
+          </a:fontRef>
+        </p:style>
+        <p:txBody>
+          <a:bodyPr rtlCol="0" anchor="ctr"/>
+          <a:lstStyle/>
+          <a:p>
+            <a:pPr algn="ctr"/>
+            <a:endParaRPr lang="en-GB">
+              <a:solidFill>
+                <a:schemeClr val="tx1"/>
+              </a:solidFill>
+            </a:endParaRPr>
+          </a:p>
+        </p:txBody>
+      </p:sp>
+      <p:graphicFrame>
+        <p:nvGraphicFramePr>
+          <p:cNvPr id="8" name="Table 7"/>
+          <p:cNvGraphicFramePr>
+            <a:graphicFrameLocks noGrp="1"/>
+          </p:cNvGraphicFramePr>
+          <p:nvPr/>
+        </p:nvGraphicFramePr>
+        <p:xfrm>
+          <a:off x="2773870" y="3772384"/>
+          <a:ext cx="8128000" cy="741680"/>
+        </p:xfrm>
+        <a:graphic>
+          <a:graphicData uri="http://schemas.openxmlformats.org/drawingml/2006/table">
+            <a:tbl>
+              <a:tblPr firstRow="1" bandRow="1">
+                <a:tableStyleId>{5940675A-B579-460E-94D1-54222C63F5DA}</a:tableStyleId>
+              </a:tblPr>
+              <a:tblGrid>
+                <a:gridCol w="6874256">
+                  <a:extLst>
+                    <a:ext uri="{9D8B030D-6E8A-4147-A177-3AD203B41FA5}">
+                      <a16:colId xmlns:a16="http://schemas.microsoft.com/office/drawing/2014/main" val="206622435"/>
+                    </a:ext>
+                  </a:extLst>
+                </a:gridCol>
+                <a:gridCol w="1253744">
+                  <a:extLst>
+                    <a:ext uri="{9D8B030D-6E8A-4147-A177-3AD203B41FA5}">
+                      <a16:colId xmlns:a16="http://schemas.microsoft.com/office/drawing/2014/main" val="2067286545"/>
+                    </a:ext>
+                  </a:extLst>
+                </a:gridCol>
+              </a:tblGrid>
+              <a:tr h="370840">
+                <a:tc>
+                  <a:txBody>
+                    <a:bodyPr/>
+                    <a:lstStyle/>
+                    <a:p>
+                      <a:r>
+                        <a:rPr lang="en-GB" dirty="0">
+                          <a:solidFill>
+                            <a:schemeClr val="tx1"/>
+                          </a:solidFill>
+                        </a:rPr>
+                        <a:t>Ann Smart and Daniele</a:t>
+                      </a:r>
+                      <a:r>
+                        <a:rPr lang="en-GB" baseline="0" dirty="0">
+                          <a:solidFill>
+                            <a:schemeClr val="tx1"/>
+                          </a:solidFill>
+                        </a:rPr>
+                        <a:t> </a:t>
+                      </a:r>
+                      <a:r>
+                        <a:rPr lang="en-GB" baseline="0" dirty="0" err="1">
+                          <a:solidFill>
+                            <a:schemeClr val="tx1"/>
+                          </a:solidFill>
+                        </a:rPr>
+                        <a:t>Hardwork</a:t>
+                      </a:r>
+                      <a:endParaRPr lang="en-GB" dirty="0">
+                        <a:solidFill>
+                          <a:schemeClr val="tx1"/>
+                        </a:solidFill>
+                      </a:endParaRPr>
+                    </a:p>
+                  </a:txBody>
+                  <a:tcPr/>
+                </a:tc>
+                <a:tc>
+                  <a:txBody>
+                    <a:bodyPr/>
+                    <a:lstStyle/>
+                    <a:p>
+                      <a:endParaRPr lang="en-GB" dirty="0"/>
+                    </a:p>
+                  </a:txBody>
+                  <a:tcPr/>
+                </a:tc>
+                <a:extLst>
+                  <a:ext uri="{0D108BD9-81ED-4DB2-BD59-A6C34878D82A}">
+                    <a16:rowId xmlns:a16="http://schemas.microsoft.com/office/drawing/2014/main" val="1927525483"/>
+                  </a:ext>
+                </a:extLst>
+              </a:tr>
+              <a:tr h="370840">
+                <a:tc>
+                  <a:txBody>
+                    <a:bodyPr/>
+                    <a:lstStyle/>
+                    <a:p>
+                      <a:r>
+                        <a:rPr lang="en-GB" dirty="0">
+                          <a:solidFill>
+                            <a:schemeClr val="tx1"/>
+                          </a:solidFill>
+                        </a:rPr>
+                        <a:t>Starch content in Arabidopsis under</a:t>
+                      </a:r>
+                      <a:r>
+                        <a:rPr lang="en-GB" baseline="0" dirty="0">
+                          <a:solidFill>
+                            <a:schemeClr val="tx1"/>
+                          </a:solidFill>
+                        </a:rPr>
+                        <a:t> different light conditions</a:t>
+                      </a:r>
+                      <a:endParaRPr lang="en-GB" dirty="0">
+                        <a:solidFill>
+                          <a:schemeClr val="tx1"/>
+                        </a:solidFill>
+                      </a:endParaRPr>
+                    </a:p>
+                  </a:txBody>
+                  <a:tcPr/>
+                </a:tc>
+                <a:tc>
+                  <a:txBody>
+                    <a:bodyPr/>
+                    <a:lstStyle/>
+                    <a:p>
+                      <a:endParaRPr lang="en-GB" dirty="0"/>
+                    </a:p>
+                  </a:txBody>
+                  <a:tcPr/>
+                </a:tc>
+                <a:extLst>
+                  <a:ext uri="{0D108BD9-81ED-4DB2-BD59-A6C34878D82A}">
+                    <a16:rowId xmlns:a16="http://schemas.microsoft.com/office/drawing/2014/main" val="3675986839"/>
+                  </a:ext>
+                </a:extLst>
+              </a:tr>
+            </a:tbl>
+          </a:graphicData>
+        </a:graphic>
+      </p:graphicFrame>
+      <p:graphicFrame>
+        <p:nvGraphicFramePr>
+          <p:cNvPr id="12" name="Table 11"/>
+          <p:cNvGraphicFramePr>
+            <a:graphicFrameLocks noGrp="1"/>
+          </p:cNvGraphicFramePr>
+          <p:nvPr/>
+        </p:nvGraphicFramePr>
+        <p:xfrm>
+          <a:off x="2773870" y="4972988"/>
+          <a:ext cx="8128000" cy="1285240"/>
+        </p:xfrm>
+        <a:graphic>
+          <a:graphicData uri="http://schemas.openxmlformats.org/drawingml/2006/table">
+            <a:tbl>
+              <a:tblPr firstRow="1" bandRow="1">
+                <a:tableStyleId>{5940675A-B579-460E-94D1-54222C63F5DA}</a:tableStyleId>
+              </a:tblPr>
+              <a:tblGrid>
+                <a:gridCol w="1188530">
+                  <a:extLst>
+                    <a:ext uri="{9D8B030D-6E8A-4147-A177-3AD203B41FA5}">
+                      <a16:colId xmlns:a16="http://schemas.microsoft.com/office/drawing/2014/main" val="206622435"/>
+                    </a:ext>
+                  </a:extLst>
+                </a:gridCol>
+                <a:gridCol w="2899346">
+                  <a:extLst>
+                    <a:ext uri="{9D8B030D-6E8A-4147-A177-3AD203B41FA5}">
+                      <a16:colId xmlns:a16="http://schemas.microsoft.com/office/drawing/2014/main" val="2067286545"/>
+                    </a:ext>
+                  </a:extLst>
+                </a:gridCol>
+                <a:gridCol w="4040124">
+                  <a:extLst>
+                    <a:ext uri="{9D8B030D-6E8A-4147-A177-3AD203B41FA5}">
+                      <a16:colId xmlns:a16="http://schemas.microsoft.com/office/drawing/2014/main" val="4081305629"/>
+                    </a:ext>
+                  </a:extLst>
+                </a:gridCol>
+              </a:tblGrid>
+              <a:tr h="370840">
+                <a:tc>
+                  <a:txBody>
+                    <a:bodyPr/>
+                    <a:lstStyle/>
+                    <a:p>
+                      <a:r>
+                        <a:rPr lang="en-GB" dirty="0">
+                          <a:solidFill>
+                            <a:schemeClr val="tx1"/>
+                          </a:solidFill>
+                        </a:rPr>
+                        <a:t>Authors </a:t>
+                      </a:r>
+                    </a:p>
+                  </a:txBody>
+                  <a:tcPr/>
+                </a:tc>
+                <a:tc>
+                  <a:txBody>
+                    <a:bodyPr/>
+                    <a:lstStyle/>
+                    <a:p>
+                      <a:r>
+                        <a:rPr lang="en-GB" dirty="0">
+                          <a:solidFill>
+                            <a:schemeClr val="tx1"/>
+                          </a:solidFill>
+                        </a:rPr>
+                        <a:t>Ann Smart </a:t>
+                      </a:r>
+                    </a:p>
+                  </a:txBody>
+                  <a:tcPr/>
+                </a:tc>
+                <a:tc>
+                  <a:txBody>
+                    <a:bodyPr/>
+                    <a:lstStyle/>
+                    <a:p>
+                      <a:r>
+                        <a:rPr lang="en-GB" dirty="0">
+                          <a:solidFill>
+                            <a:schemeClr val="tx1"/>
+                          </a:solidFill>
+                        </a:rPr>
+                        <a:t>Daniele</a:t>
+                      </a:r>
+                      <a:r>
+                        <a:rPr lang="en-GB" baseline="0" dirty="0">
+                          <a:solidFill>
+                            <a:schemeClr val="tx1"/>
+                          </a:solidFill>
+                        </a:rPr>
+                        <a:t> </a:t>
+                      </a:r>
+                      <a:r>
+                        <a:rPr lang="en-GB" baseline="0" dirty="0" err="1">
+                          <a:solidFill>
+                            <a:schemeClr val="tx1"/>
+                          </a:solidFill>
+                        </a:rPr>
+                        <a:t>Hardwork</a:t>
+                      </a:r>
+                      <a:endParaRPr lang="en-GB" dirty="0">
+                        <a:solidFill>
+                          <a:schemeClr val="tx1"/>
+                        </a:solidFill>
+                      </a:endParaRPr>
+                    </a:p>
+                  </a:txBody>
+                  <a:tcPr/>
+                </a:tc>
+                <a:extLst>
+                  <a:ext uri="{0D108BD9-81ED-4DB2-BD59-A6C34878D82A}">
+                    <a16:rowId xmlns:a16="http://schemas.microsoft.com/office/drawing/2014/main" val="1927525483"/>
+                  </a:ext>
+                </a:extLst>
+              </a:tr>
+              <a:tr h="370840">
+                <a:tc>
+                  <a:txBody>
+                    <a:bodyPr/>
+                    <a:lstStyle/>
+                    <a:p>
+                      <a:r>
+                        <a:rPr lang="en-GB" dirty="0">
+                          <a:solidFill>
+                            <a:schemeClr val="tx1"/>
+                          </a:solidFill>
+                        </a:rPr>
+                        <a:t>Title</a:t>
+                      </a:r>
+                    </a:p>
+                  </a:txBody>
+                  <a:tcPr/>
+                </a:tc>
+                <a:tc>
+                  <a:txBody>
+                    <a:bodyPr/>
+                    <a:lstStyle/>
+                    <a:p>
+                      <a:r>
+                        <a:rPr lang="en-GB" dirty="0">
+                          <a:solidFill>
+                            <a:schemeClr val="tx1"/>
+                          </a:solidFill>
+                        </a:rPr>
+                        <a:t>Starch content in Arabidopsis under</a:t>
+                      </a:r>
+                      <a:r>
+                        <a:rPr lang="en-GB" baseline="0" dirty="0">
+                          <a:solidFill>
+                            <a:schemeClr val="tx1"/>
+                          </a:solidFill>
+                        </a:rPr>
+                        <a:t> different light conditions</a:t>
+                      </a:r>
+                      <a:endParaRPr lang="en-GB" dirty="0">
+                        <a:solidFill>
+                          <a:schemeClr val="tx1"/>
+                        </a:solidFill>
+                      </a:endParaRPr>
+                    </a:p>
+                  </a:txBody>
+                  <a:tcPr/>
+                </a:tc>
+                <a:tc>
+                  <a:txBody>
+                    <a:bodyPr/>
+                    <a:lstStyle/>
+                    <a:p>
+                      <a:endParaRPr lang="en-GB" dirty="0">
+                        <a:solidFill>
+                          <a:schemeClr val="tx1"/>
+                        </a:solidFill>
+                      </a:endParaRPr>
+                    </a:p>
+                  </a:txBody>
+                  <a:tcPr/>
+                </a:tc>
+                <a:extLst>
+                  <a:ext uri="{0D108BD9-81ED-4DB2-BD59-A6C34878D82A}">
+                    <a16:rowId xmlns:a16="http://schemas.microsoft.com/office/drawing/2014/main" val="3675986839"/>
+                  </a:ext>
+                </a:extLst>
+              </a:tr>
+            </a:tbl>
+          </a:graphicData>
+        </a:graphic>
+      </p:graphicFrame>
+      <p:sp>
+        <p:nvSpPr>
+          <p:cNvPr id="3" name="Rectangle 2"/>
+          <p:cNvSpPr/>
+          <p:nvPr/>
+        </p:nvSpPr>
+        <p:spPr>
+          <a:xfrm>
+            <a:off x="5590092" y="1515716"/>
+            <a:ext cx="1279517" cy="369332"/>
+          </a:xfrm>
+          <a:prstGeom prst="rect">
+            <a:avLst/>
+          </a:prstGeom>
+        </p:spPr>
+        <p:txBody>
+          <a:bodyPr wrap="none">
+            <a:spAutoFit/>
+          </a:bodyPr>
+          <a:lstStyle/>
+          <a:p>
+            <a:r>
+              <a:rPr lang="en-GB" dirty="0"/>
+              <a:t>! “ # $ % &amp; '</a:t>
+            </a:r>
+          </a:p>
+        </p:txBody>
+      </p:sp>
+      <p:sp>
+        <p:nvSpPr>
+          <p:cNvPr id="6" name="Rectangle 5"/>
+          <p:cNvSpPr/>
+          <p:nvPr/>
+        </p:nvSpPr>
+        <p:spPr>
+          <a:xfrm>
+            <a:off x="5697868" y="1850625"/>
+            <a:ext cx="955711" cy="369332"/>
+          </a:xfrm>
+          <a:prstGeom prst="rect">
+            <a:avLst/>
+          </a:prstGeom>
+        </p:spPr>
+        <p:txBody>
+          <a:bodyPr wrap="none">
+            <a:spAutoFit/>
+          </a:bodyPr>
+          <a:lstStyle/>
+          <a:p>
+            <a:r>
+              <a:rPr lang="en-GB" dirty="0" err="1"/>
+              <a:t>óęłńöüä</a:t>
+            </a:r>
+            <a:endParaRPr lang="en-GB" dirty="0"/>
+          </a:p>
+        </p:txBody>
+      </p:sp>
+      <p:sp>
+        <p:nvSpPr>
+          <p:cNvPr id="13" name="Title 1">
+            <a:extLst>
+              <a:ext uri="{FF2B5EF4-FFF2-40B4-BE49-F238E27FC236}">
+                <a16:creationId xmlns:a16="http://schemas.microsoft.com/office/drawing/2014/main" id="{2E48EEDE-6B7C-F048-B09C-D1002A57B0B8}"/>
               </a:ext>
             </a:extLst>
           </p:cNvPr>
@@ -6029,7 +7316,7 @@
         </p:nvSpPr>
         <p:spPr>
           <a:xfrm>
-            <a:off x="838200" y="100561"/>
+            <a:off x="847344" y="338305"/>
             <a:ext cx="10515600" cy="1325563"/>
           </a:xfrm>
         </p:spPr>
@@ -6038,46 +7325,20 @@
           <a:lstStyle/>
           <a:p>
             <a:r>
-              <a:rPr lang="en-GB" dirty="0"/>
+              <a:rPr lang="en-GB" dirty="0">
+                <a:solidFill>
+                  <a:schemeClr val="accent1"/>
+                </a:solidFill>
+              </a:rPr>
               <a:t>Common Spreadsheet errors</a:t>
             </a:r>
           </a:p>
         </p:txBody>
       </p:sp>
-      <p:pic>
-        <p:nvPicPr>
-          <p:cNvPr id="11" name="Obraz 10">
-            <a:extLst>
-              <a:ext uri="{FF2B5EF4-FFF2-40B4-BE49-F238E27FC236}">
-                <a16:creationId xmlns:a16="http://schemas.microsoft.com/office/drawing/2014/main" id="{36E1D28E-C519-4369-8A77-E8ED9EACE049}"/>
-              </a:ext>
-            </a:extLst>
-          </p:cNvPr>
-          <p:cNvPicPr>
-            <a:picLocks noChangeAspect="1"/>
-          </p:cNvPicPr>
-          <p:nvPr/>
-        </p:nvPicPr>
-        <p:blipFill>
-          <a:blip r:embed="rId2"/>
-          <a:stretch>
-            <a:fillRect/>
-          </a:stretch>
-        </p:blipFill>
-        <p:spPr>
-          <a:xfrm>
-            <a:off x="2709862" y="3652837"/>
-            <a:ext cx="6219825" cy="1247775"/>
-          </a:xfrm>
-          <a:prstGeom prst="rect">
-            <a:avLst/>
-          </a:prstGeom>
-        </p:spPr>
-      </p:pic>
     </p:spTree>
     <p:extLst>
       <p:ext uri="{BB962C8B-B14F-4D97-AF65-F5344CB8AC3E}">
-        <p14:creationId xmlns:p14="http://schemas.microsoft.com/office/powerpoint/2010/main" val="2878400457"/>
+        <p14:creationId xmlns:p14="http://schemas.microsoft.com/office/powerpoint/2010/main" val="3699202772"/>
       </p:ext>
     </p:extLst>
   </p:cSld>
@@ -6118,8 +7379,8 @@
         </p:nvSpPr>
         <p:spPr>
           <a:xfrm>
-            <a:off x="780832" y="1182161"/>
-            <a:ext cx="6612428" cy="2369880"/>
+            <a:off x="1356140" y="248518"/>
+            <a:ext cx="9464530" cy="954107"/>
           </a:xfrm>
           <a:prstGeom prst="rect">
             <a:avLst/>
@@ -6132,92 +7393,108 @@
           </a:bodyPr>
           <a:lstStyle/>
           <a:p>
-            <a:pPr marL="457200" indent="-457200">
-              <a:buFont typeface="Arial" panose="020B0604020202020204" pitchFamily="34" charset="0"/>
-              <a:buChar char="•"/>
-            </a:pPr>
-            <a:endParaRPr lang="pl-PL" sz="2400" dirty="0">
+            <a:pPr algn="ctr"/>
+            <a:endParaRPr lang="en-GB" sz="2800" dirty="0">
               <a:solidFill>
                 <a:srgbClr val="0070C0"/>
               </a:solidFill>
             </a:endParaRPr>
           </a:p>
           <a:p>
-            <a:pPr marL="342900" indent="-342900">
-              <a:buFont typeface="Arial" panose="020B0604020202020204" pitchFamily="34" charset="0"/>
-              <a:buChar char="•"/>
-            </a:pPr>
-            <a:r>
-              <a:rPr lang="en-GB" sz="2400" dirty="0">
-                <a:solidFill>
-                  <a:srgbClr val="0070C0"/>
-                </a:solidFill>
-              </a:rPr>
-              <a:t>Using special characters in data</a:t>
-            </a:r>
-          </a:p>
-          <a:p>
-            <a:pPr lvl="1"/>
-            <a:r>
-              <a:rPr lang="pl-PL" sz="2000" dirty="0">
-                <a:solidFill>
-                  <a:srgbClr val="0070C0"/>
-                </a:solidFill>
-              </a:rPr>
-              <a:t>Programs still</a:t>
-            </a:r>
-            <a:r>
-              <a:rPr lang="en-GB" sz="2000" dirty="0">
-                <a:solidFill>
-                  <a:srgbClr val="0070C0"/>
-                </a:solidFill>
-              </a:rPr>
-              <a:t> struggle with these</a:t>
-            </a:r>
-            <a:endParaRPr lang="pl-PL" sz="2000" dirty="0">
-              <a:solidFill>
-                <a:srgbClr val="0070C0"/>
-              </a:solidFill>
-            </a:endParaRPr>
-          </a:p>
-          <a:p>
-            <a:pPr lvl="1"/>
-            <a:endParaRPr lang="pl-PL" sz="2000" dirty="0">
-              <a:solidFill>
-                <a:srgbClr val="0070C0"/>
-              </a:solidFill>
-            </a:endParaRPr>
-          </a:p>
-          <a:p>
-            <a:pPr marL="342900" indent="-342900">
-              <a:buFont typeface="Arial" panose="020B0604020202020204" pitchFamily="34" charset="0"/>
-              <a:buChar char="•"/>
-            </a:pPr>
-            <a:r>
-              <a:rPr lang="en-GB" sz="2000" dirty="0">
-                <a:solidFill>
-                  <a:srgbClr val="0070C0"/>
-                </a:solidFill>
-              </a:rPr>
-              <a:t>Values without fields: always label values with column headers</a:t>
-            </a:r>
-          </a:p>
-          <a:p>
-            <a:pPr lvl="1"/>
-            <a:endParaRPr lang="en-GB" sz="2000" dirty="0">
-              <a:solidFill>
-                <a:srgbClr val="0070C0"/>
-              </a:solidFill>
-            </a:endParaRPr>
-          </a:p>
-        </p:txBody>
-      </p:sp>
+            <a:pPr algn="ctr"/>
+            <a:r>
+              <a:rPr lang="en-GB" sz="2800" dirty="0">
+                <a:solidFill>
+                  <a:srgbClr val="0070C0"/>
+                </a:solidFill>
+              </a:rPr>
+              <a:t>Spotting problems</a:t>
+            </a:r>
+          </a:p>
+        </p:txBody>
+      </p:sp>
+      <p:pic>
+        <p:nvPicPr>
+          <p:cNvPr id="6" name="Picture 5"/>
+          <p:cNvPicPr>
+            <a:picLocks noChangeAspect="1"/>
+          </p:cNvPicPr>
+          <p:nvPr/>
+        </p:nvPicPr>
+        <p:blipFill rotWithShape="1">
+          <a:blip r:embed="rId2" cstate="print">
+            <a:extLst>
+              <a:ext uri="{28A0092B-C50C-407E-A947-70E740481C1C}">
+                <a14:useLocalDpi xmlns:a14="http://schemas.microsoft.com/office/drawing/2010/main" val="0"/>
+              </a:ext>
+            </a:extLst>
+          </a:blip>
+          <a:srcRect l="186" t="-43"/>
+          <a:stretch/>
+        </p:blipFill>
+        <p:spPr>
+          <a:xfrm>
+            <a:off x="914400" y="1202626"/>
+            <a:ext cx="10159682" cy="5355736"/>
+          </a:xfrm>
+          <a:prstGeom prst="rect">
+            <a:avLst/>
+          </a:prstGeom>
+        </p:spPr>
+      </p:pic>
+      <p:pic>
+        <p:nvPicPr>
+          <p:cNvPr id="4" name="Picture 2" descr="Ed_DaSH">
+            <a:extLst>
+              <a:ext uri="{FF2B5EF4-FFF2-40B4-BE49-F238E27FC236}">
+                <a16:creationId xmlns:a16="http://schemas.microsoft.com/office/drawing/2014/main" id="{A783256F-E39E-4712-96B0-240BD611CFEB}"/>
+              </a:ext>
+            </a:extLst>
+          </p:cNvPr>
+          <p:cNvPicPr>
+            <a:picLocks noChangeAspect="1" noChangeArrowheads="1"/>
+          </p:cNvPicPr>
+          <p:nvPr/>
+        </p:nvPicPr>
+        <p:blipFill>
+          <a:blip r:embed="rId3" cstate="hqprint">
+            <a:extLst>
+              <a:ext uri="{28A0092B-C50C-407E-A947-70E740481C1C}">
+                <a14:useLocalDpi xmlns:a14="http://schemas.microsoft.com/office/drawing/2010/main" val="0"/>
+              </a:ext>
+            </a:extLst>
+          </a:blip>
+          <a:srcRect/>
+          <a:stretch>
+            <a:fillRect/>
+          </a:stretch>
+        </p:blipFill>
+        <p:spPr bwMode="auto">
+          <a:xfrm>
+            <a:off x="10820670" y="5458691"/>
+            <a:ext cx="1289214" cy="1325418"/>
+          </a:xfrm>
+          <a:prstGeom prst="rect">
+            <a:avLst/>
+          </a:prstGeom>
+          <a:noFill/>
+          <a:extLst>
+            <a:ext uri="{909E8E84-426E-40DD-AFC4-6F175D3DCCD1}">
+              <a14:hiddenFill xmlns:a14="http://schemas.microsoft.com/office/drawing/2010/main">
+                <a:solidFill>
+                  <a:srgbClr val="FFFFFF"/>
+                </a:solidFill>
+              </a14:hiddenFill>
+            </a:ext>
+          </a:extLst>
+        </p:spPr>
+      </p:pic>
       <p:sp>
         <p:nvSpPr>
           <p:cNvPr id="7" name="Title 1">
             <a:extLst>
               <a:ext uri="{FF2B5EF4-FFF2-40B4-BE49-F238E27FC236}">
-                <a16:creationId xmlns:a16="http://schemas.microsoft.com/office/drawing/2014/main" id="{DE99D39D-7DF9-3346-9E54-14E25A2A8B09}"/>
+                <a16:creationId xmlns:a16="http://schemas.microsoft.com/office/drawing/2014/main" id="{C2203D28-8CC3-4646-81CF-16E1F45B0028}"/>
               </a:ext>
             </a:extLst>
           </p:cNvPr>
@@ -6240,45 +7517,15 @@
           <a:p>
             <a:r>
               <a:rPr lang="en-GB" dirty="0"/>
-              <a:t>Common Spreadsheet errors</a:t>
-            </a:r>
-          </a:p>
-        </p:txBody>
-      </p:sp>
-      <p:pic>
-        <p:nvPicPr>
-          <p:cNvPr id="9" name="Obraz 8">
-            <a:extLst>
-              <a:ext uri="{FF2B5EF4-FFF2-40B4-BE49-F238E27FC236}">
-                <a16:creationId xmlns:a16="http://schemas.microsoft.com/office/drawing/2014/main" id="{BC400CA6-F56A-4DF9-8D76-BB204EAFF578}"/>
-              </a:ext>
-            </a:extLst>
-          </p:cNvPr>
-          <p:cNvPicPr>
-            <a:picLocks noChangeAspect="1"/>
-          </p:cNvPicPr>
-          <p:nvPr/>
-        </p:nvPicPr>
-        <p:blipFill>
-          <a:blip r:embed="rId2"/>
-          <a:stretch>
-            <a:fillRect/>
-          </a:stretch>
-        </p:blipFill>
-        <p:spPr>
-          <a:xfrm>
-            <a:off x="2252662" y="3633787"/>
-            <a:ext cx="7458075" cy="1266825"/>
-          </a:xfrm>
-          <a:prstGeom prst="rect">
-            <a:avLst/>
-          </a:prstGeom>
-        </p:spPr>
-      </p:pic>
+              <a:t>Exercise 2:</a:t>
+            </a:r>
+          </a:p>
+        </p:txBody>
+      </p:sp>
     </p:spTree>
     <p:extLst>
       <p:ext uri="{BB962C8B-B14F-4D97-AF65-F5344CB8AC3E}">
-        <p14:creationId xmlns:p14="http://schemas.microsoft.com/office/powerpoint/2010/main" val="2421650859"/>
+        <p14:creationId xmlns:p14="http://schemas.microsoft.com/office/powerpoint/2010/main" val="3960340349"/>
       </p:ext>
     </p:extLst>
   </p:cSld>
@@ -6638,24 +7885,15 @@
           <a:p>
             <a:r>
               <a:rPr lang="en-GB" dirty="0"/>
-              <a:t>Exercise 2: </a:t>
-            </a:r>
-            <a:r>
-              <a:rPr lang="en-GB" sz="4400" dirty="0">
-                <a:solidFill>
-                  <a:srgbClr val="0070C0"/>
-                </a:solidFill>
-              </a:rPr>
-              <a:t>Spotting problems</a:t>
-            </a:r>
-            <a:endParaRPr lang="en-GB" dirty="0"/>
+              <a:t>Exercise 2: Solution</a:t>
+            </a:r>
           </a:p>
         </p:txBody>
       </p:sp>
     </p:spTree>
     <p:extLst>
       <p:ext uri="{BB962C8B-B14F-4D97-AF65-F5344CB8AC3E}">
-        <p14:creationId xmlns:p14="http://schemas.microsoft.com/office/powerpoint/2010/main" val="2935246685"/>
+        <p14:creationId xmlns:p14="http://schemas.microsoft.com/office/powerpoint/2010/main" val="3430938935"/>
       </p:ext>
     </p:extLst>
   </p:cSld>
@@ -7164,53 +8402,10 @@
           </a:p>
         </p:txBody>
       </p:sp>
-      <p:cxnSp>
-        <p:nvCxnSpPr>
-          <p:cNvPr id="5" name="Straight Connector 4">
-            <a:extLst>
-              <a:ext uri="{FF2B5EF4-FFF2-40B4-BE49-F238E27FC236}">
-                <a16:creationId xmlns:a16="http://schemas.microsoft.com/office/drawing/2014/main" id="{AF7992CE-A95E-4FE6-AEA5-F2B49AE3147E}"/>
-              </a:ext>
-            </a:extLst>
-          </p:cNvPr>
-          <p:cNvCxnSpPr>
-            <a:cxnSpLocks/>
-          </p:cNvCxnSpPr>
-          <p:nvPr/>
-        </p:nvCxnSpPr>
-        <p:spPr>
-          <a:xfrm>
-            <a:off x="855742" y="6452318"/>
-            <a:ext cx="1300592" cy="6690"/>
-          </a:xfrm>
-          <a:prstGeom prst="line">
-            <a:avLst/>
-          </a:prstGeom>
-          <a:ln w="38100">
-            <a:solidFill>
-              <a:srgbClr val="FF0000"/>
-            </a:solidFill>
-          </a:ln>
-        </p:spPr>
-        <p:style>
-          <a:lnRef idx="1">
-            <a:schemeClr val="accent1"/>
-          </a:lnRef>
-          <a:fillRef idx="0">
-            <a:schemeClr val="accent1"/>
-          </a:fillRef>
-          <a:effectRef idx="0">
-            <a:schemeClr val="accent1"/>
-          </a:effectRef>
-          <a:fontRef idx="minor">
-            <a:schemeClr val="tx1"/>
-          </a:fontRef>
-        </p:style>
-      </p:cxnSp>
     </p:spTree>
     <p:extLst>
       <p:ext uri="{BB962C8B-B14F-4D97-AF65-F5344CB8AC3E}">
-        <p14:creationId xmlns:p14="http://schemas.microsoft.com/office/powerpoint/2010/main" val="958630786"/>
+        <p14:creationId xmlns:p14="http://schemas.microsoft.com/office/powerpoint/2010/main" val="2770055593"/>
       </p:ext>
     </p:extLst>
   </p:cSld>
@@ -7898,53 +9093,10 @@
           </a:p>
         </p:txBody>
       </p:sp>
-      <p:cxnSp>
-        <p:nvCxnSpPr>
-          <p:cNvPr id="14" name="Straight Connector 13">
-            <a:extLst>
-              <a:ext uri="{FF2B5EF4-FFF2-40B4-BE49-F238E27FC236}">
-                <a16:creationId xmlns:a16="http://schemas.microsoft.com/office/drawing/2014/main" id="{FC7D94E2-5FFE-4CA5-8D6E-F02E6088A80B}"/>
-              </a:ext>
-            </a:extLst>
-          </p:cNvPr>
-          <p:cNvCxnSpPr>
-            <a:cxnSpLocks/>
-          </p:cNvCxnSpPr>
-          <p:nvPr/>
-        </p:nvCxnSpPr>
-        <p:spPr>
-          <a:xfrm>
-            <a:off x="2710915" y="6452318"/>
-            <a:ext cx="1300592" cy="6690"/>
-          </a:xfrm>
-          <a:prstGeom prst="line">
-            <a:avLst/>
-          </a:prstGeom>
-          <a:ln w="38100">
-            <a:solidFill>
-              <a:srgbClr val="FF0000"/>
-            </a:solidFill>
-          </a:ln>
-        </p:spPr>
-        <p:style>
-          <a:lnRef idx="1">
-            <a:schemeClr val="accent1"/>
-          </a:lnRef>
-          <a:fillRef idx="0">
-            <a:schemeClr val="accent1"/>
-          </a:fillRef>
-          <a:effectRef idx="0">
-            <a:schemeClr val="accent1"/>
-          </a:effectRef>
-          <a:fontRef idx="minor">
-            <a:schemeClr val="tx1"/>
-          </a:fontRef>
-        </p:style>
-      </p:cxnSp>
     </p:spTree>
     <p:extLst>
       <p:ext uri="{BB962C8B-B14F-4D97-AF65-F5344CB8AC3E}">
-        <p14:creationId xmlns:p14="http://schemas.microsoft.com/office/powerpoint/2010/main" val="148714335"/>
+        <p14:creationId xmlns:p14="http://schemas.microsoft.com/office/powerpoint/2010/main" val="3858745666"/>
       </p:ext>
     </p:extLst>
   </p:cSld>
@@ -8481,53 +9633,10 @@
           </a:p>
         </p:txBody>
       </p:sp>
-      <p:cxnSp>
-        <p:nvCxnSpPr>
-          <p:cNvPr id="15" name="Straight Connector 14">
-            <a:extLst>
-              <a:ext uri="{FF2B5EF4-FFF2-40B4-BE49-F238E27FC236}">
-                <a16:creationId xmlns:a16="http://schemas.microsoft.com/office/drawing/2014/main" id="{5878ACE4-C41B-4CEB-930E-0B1DB37B35BE}"/>
-              </a:ext>
-            </a:extLst>
-          </p:cNvPr>
-          <p:cNvCxnSpPr>
-            <a:cxnSpLocks/>
-          </p:cNvCxnSpPr>
-          <p:nvPr/>
-        </p:nvCxnSpPr>
-        <p:spPr>
-          <a:xfrm>
-            <a:off x="4513334" y="6452318"/>
-            <a:ext cx="1300592" cy="6690"/>
-          </a:xfrm>
-          <a:prstGeom prst="line">
-            <a:avLst/>
-          </a:prstGeom>
-          <a:ln w="38100">
-            <a:solidFill>
-              <a:srgbClr val="FF0000"/>
-            </a:solidFill>
-          </a:ln>
-        </p:spPr>
-        <p:style>
-          <a:lnRef idx="1">
-            <a:schemeClr val="accent1"/>
-          </a:lnRef>
-          <a:fillRef idx="0">
-            <a:schemeClr val="accent1"/>
-          </a:fillRef>
-          <a:effectRef idx="0">
-            <a:schemeClr val="accent1"/>
-          </a:effectRef>
-          <a:fontRef idx="minor">
-            <a:schemeClr val="tx1"/>
-          </a:fontRef>
-        </p:style>
-      </p:cxnSp>
     </p:spTree>
     <p:extLst>
       <p:ext uri="{BB962C8B-B14F-4D97-AF65-F5344CB8AC3E}">
-        <p14:creationId xmlns:p14="http://schemas.microsoft.com/office/powerpoint/2010/main" val="3563625886"/>
+        <p14:creationId xmlns:p14="http://schemas.microsoft.com/office/powerpoint/2010/main" val="3954199724"/>
       </p:ext>
     </p:extLst>
   </p:cSld>
@@ -9156,53 +10265,10 @@
           </a:p>
         </p:txBody>
       </p:sp>
-      <p:cxnSp>
-        <p:nvCxnSpPr>
-          <p:cNvPr id="18" name="Straight Connector 17">
-            <a:extLst>
-              <a:ext uri="{FF2B5EF4-FFF2-40B4-BE49-F238E27FC236}">
-                <a16:creationId xmlns:a16="http://schemas.microsoft.com/office/drawing/2014/main" id="{B2836C9A-0915-4007-AC43-3F3FC59D36CD}"/>
-              </a:ext>
-            </a:extLst>
-          </p:cNvPr>
-          <p:cNvCxnSpPr>
-            <a:cxnSpLocks/>
-          </p:cNvCxnSpPr>
-          <p:nvPr/>
-        </p:nvCxnSpPr>
-        <p:spPr>
-          <a:xfrm>
-            <a:off x="6438846" y="6452318"/>
-            <a:ext cx="1300592" cy="6690"/>
-          </a:xfrm>
-          <a:prstGeom prst="line">
-            <a:avLst/>
-          </a:prstGeom>
-          <a:ln w="38100">
-            <a:solidFill>
-              <a:srgbClr val="FF0000"/>
-            </a:solidFill>
-          </a:ln>
-        </p:spPr>
-        <p:style>
-          <a:lnRef idx="1">
-            <a:schemeClr val="accent1"/>
-          </a:lnRef>
-          <a:fillRef idx="0">
-            <a:schemeClr val="accent1"/>
-          </a:fillRef>
-          <a:effectRef idx="0">
-            <a:schemeClr val="accent1"/>
-          </a:effectRef>
-          <a:fontRef idx="minor">
-            <a:schemeClr val="tx1"/>
-          </a:fontRef>
-        </p:style>
-      </p:cxnSp>
     </p:spTree>
     <p:extLst>
       <p:ext uri="{BB962C8B-B14F-4D97-AF65-F5344CB8AC3E}">
-        <p14:creationId xmlns:p14="http://schemas.microsoft.com/office/powerpoint/2010/main" val="2891694583"/>
+        <p14:creationId xmlns:p14="http://schemas.microsoft.com/office/powerpoint/2010/main" val="2784341807"/>
       </p:ext>
     </p:extLst>
   </p:cSld>
@@ -9529,7 +10595,7 @@
                   <a:srgbClr val="0070C0"/>
                 </a:solidFill>
               </a:rPr>
-              <a:t>Row 5 		Row 2 		Column C 	Column E 	Column L</a:t>
+              <a:t>Row 5 		Row 2 		Column C 	Column E 	Row 22</a:t>
             </a:r>
           </a:p>
         </p:txBody>
@@ -9724,18 +10790,13 @@
           <a:p>
             <a:pPr algn="just"/>
             <a:r>
-              <a:rPr lang="pl-PL" b="1" dirty="0">
-                <a:solidFill>
-                  <a:srgbClr val="0070C0"/>
-                </a:solidFill>
-              </a:rPr>
-              <a:t>4</a:t>
-            </a:r>
-            <a:endParaRPr lang="en-GB" b="1" dirty="0">
-              <a:solidFill>
-                <a:srgbClr val="0070C0"/>
-              </a:solidFill>
-            </a:endParaRPr>
+              <a:rPr lang="en-GB" b="1" dirty="0">
+                <a:solidFill>
+                  <a:srgbClr val="0070C0"/>
+                </a:solidFill>
+              </a:rPr>
+              <a:t>3</a:t>
+            </a:r>
           </a:p>
         </p:txBody>
       </p:sp>
@@ -9753,7 +10814,7 @@
         </p:nvSpPr>
         <p:spPr>
           <a:xfrm>
-            <a:off x="104816" y="1891588"/>
+            <a:off x="117312" y="1610234"/>
             <a:ext cx="320035" cy="337539"/>
           </a:xfrm>
           <a:prstGeom prst="ellipse">
@@ -9824,53 +10885,10 @@
           </a:p>
         </p:txBody>
       </p:sp>
-      <p:cxnSp>
-        <p:nvCxnSpPr>
-          <p:cNvPr id="18" name="Straight Connector 17">
-            <a:extLst>
-              <a:ext uri="{FF2B5EF4-FFF2-40B4-BE49-F238E27FC236}">
-                <a16:creationId xmlns:a16="http://schemas.microsoft.com/office/drawing/2014/main" id="{A61F0243-8D5D-4BDB-83C6-74B5A118D17D}"/>
-              </a:ext>
-            </a:extLst>
-          </p:cNvPr>
-          <p:cNvCxnSpPr>
-            <a:cxnSpLocks/>
-          </p:cNvCxnSpPr>
-          <p:nvPr/>
-        </p:nvCxnSpPr>
-        <p:spPr>
-          <a:xfrm>
-            <a:off x="8206105" y="6452318"/>
-            <a:ext cx="1300592" cy="6690"/>
-          </a:xfrm>
-          <a:prstGeom prst="line">
-            <a:avLst/>
-          </a:prstGeom>
-          <a:ln w="38100">
-            <a:solidFill>
-              <a:srgbClr val="FF0000"/>
-            </a:solidFill>
-          </a:ln>
-        </p:spPr>
-        <p:style>
-          <a:lnRef idx="1">
-            <a:schemeClr val="accent1"/>
-          </a:lnRef>
-          <a:fillRef idx="0">
-            <a:schemeClr val="accent1"/>
-          </a:fillRef>
-          <a:effectRef idx="0">
-            <a:schemeClr val="accent1"/>
-          </a:effectRef>
-          <a:fontRef idx="minor">
-            <a:schemeClr val="tx1"/>
-          </a:fontRef>
-        </p:style>
-      </p:cxnSp>
     </p:spTree>
     <p:extLst>
       <p:ext uri="{BB962C8B-B14F-4D97-AF65-F5344CB8AC3E}">
-        <p14:creationId xmlns:p14="http://schemas.microsoft.com/office/powerpoint/2010/main" val="2438525704"/>
+        <p14:creationId xmlns:p14="http://schemas.microsoft.com/office/powerpoint/2010/main" val="1330656894"/>
       </p:ext>
     </p:extLst>
   </p:cSld>
@@ -9955,23 +10973,7 @@
                   <a:srgbClr val="0070C0"/>
                 </a:solidFill>
               </a:rPr>
-              <a:t>How long do you think it t</a:t>
-            </a:r>
-            <a:r>
-              <a:rPr lang="pl-PL" sz="2400" dirty="0">
-                <a:solidFill>
-                  <a:srgbClr val="0070C0"/>
-                </a:solidFill>
-              </a:rPr>
-              <a:t>akes</a:t>
-            </a:r>
-            <a:r>
-              <a:rPr lang="en-GB" sz="2400" dirty="0">
-                <a:solidFill>
-                  <a:srgbClr val="0070C0"/>
-                </a:solidFill>
-              </a:rPr>
-              <a:t> to "clean" the original, problematic data?</a:t>
+              <a:t>How long do you think it took to "clean" the original, problematic data?</a:t>
             </a:r>
           </a:p>
         </p:txBody>
@@ -10041,7 +11043,7 @@
     </p:spTree>
     <p:extLst>
       <p:ext uri="{BB962C8B-B14F-4D97-AF65-F5344CB8AC3E}">
-        <p14:creationId xmlns:p14="http://schemas.microsoft.com/office/powerpoint/2010/main" val="3259249638"/>
+        <p14:creationId xmlns:p14="http://schemas.microsoft.com/office/powerpoint/2010/main" val="1682483597"/>
       </p:ext>
     </p:extLst>
   </p:cSld>
@@ -10235,13 +11237,7 @@
           <p:cNvGraphicFramePr>
             <a:graphicFrameLocks noGrp="1"/>
           </p:cNvGraphicFramePr>
-          <p:nvPr>
-            <p:extLst>
-              <p:ext uri="{D42A27DB-BD31-4B8C-83A1-F6EECF244321}">
-                <p14:modId xmlns:p14="http://schemas.microsoft.com/office/powerpoint/2010/main" val="1362561532"/>
-              </p:ext>
-            </p:extLst>
-          </p:nvPr>
+          <p:nvPr/>
         </p:nvGraphicFramePr>
         <p:xfrm>
           <a:off x="3579325" y="2123765"/>
@@ -10950,7 +11946,7 @@
     </p:spTree>
     <p:extLst>
       <p:ext uri="{BB962C8B-B14F-4D97-AF65-F5344CB8AC3E}">
-        <p14:creationId xmlns:p14="http://schemas.microsoft.com/office/powerpoint/2010/main" val="1908239480"/>
+        <p14:creationId xmlns:p14="http://schemas.microsoft.com/office/powerpoint/2010/main" val="3189963343"/>
       </p:ext>
     </p:extLst>
   </p:cSld>
@@ -11094,8 +12090,8 @@
         </p:nvSpPr>
         <p:spPr>
           <a:xfrm>
-            <a:off x="811875" y="5296561"/>
-            <a:ext cx="8140390" cy="830997"/>
+            <a:off x="811874" y="5296561"/>
+            <a:ext cx="8586125" cy="830997"/>
           </a:xfrm>
           <a:prstGeom prst="rect">
             <a:avLst/>
@@ -11112,8 +12108,17 @@
                 <a:solidFill>
                   <a:srgbClr val="0070C0"/>
                 </a:solidFill>
-              </a:rPr>
-              <a:t>When using text files (.csv, .</a:t>
+                <a:sym typeface="Wingdings" panose="05000000000000000000" pitchFamily="2" charset="2"/>
+              </a:rPr>
+              <a:t> </a:t>
+            </a:r>
+            <a:r>
+              <a:rPr lang="en-GB" sz="2400" dirty="0">
+                <a:solidFill>
+                  <a:srgbClr val="0070C0"/>
+                </a:solidFill>
+              </a:rPr>
+              <a:t>Always document what format you are using to represent dates when using text files (.csv, .</a:t>
             </a:r>
             <a:r>
               <a:rPr lang="en-GB" sz="2400" dirty="0" err="1">
@@ -11129,7 +12134,7 @@
                   <a:srgbClr val="0070C0"/>
                 </a:solidFill>
               </a:rPr>
-              <a:t>), You should always document what format you are using to represent dates.</a:t>
+              <a:t>) .</a:t>
             </a:r>
             <a:endParaRPr lang="en-GB" sz="2400" dirty="0"/>
           </a:p>
@@ -11171,7 +12176,7 @@
     </p:spTree>
     <p:extLst>
       <p:ext uri="{BB962C8B-B14F-4D97-AF65-F5344CB8AC3E}">
-        <p14:creationId xmlns:p14="http://schemas.microsoft.com/office/powerpoint/2010/main" val="1659394794"/>
+        <p14:creationId xmlns:p14="http://schemas.microsoft.com/office/powerpoint/2010/main" val="2121530681"/>
       </p:ext>
     </p:extLst>
   </p:cSld>
@@ -11270,7 +12275,7 @@
     </p:spTree>
     <p:extLst>
       <p:ext uri="{BB962C8B-B14F-4D97-AF65-F5344CB8AC3E}">
-        <p14:creationId xmlns:p14="http://schemas.microsoft.com/office/powerpoint/2010/main" val="3788573813"/>
+        <p14:creationId xmlns:p14="http://schemas.microsoft.com/office/powerpoint/2010/main" val="1936151461"/>
       </p:ext>
     </p:extLst>
   </p:cSld>
@@ -11421,7 +12426,7 @@
     </p:spTree>
     <p:extLst>
       <p:ext uri="{BB962C8B-B14F-4D97-AF65-F5344CB8AC3E}">
-        <p14:creationId xmlns:p14="http://schemas.microsoft.com/office/powerpoint/2010/main" val="2096684493"/>
+        <p14:creationId xmlns:p14="http://schemas.microsoft.com/office/powerpoint/2010/main" val="221246298"/>
       </p:ext>
     </p:extLst>
   </p:cSld>
@@ -11462,8 +12467,8 @@
         </p:nvSpPr>
         <p:spPr>
           <a:xfrm>
-            <a:off x="780831" y="1182161"/>
-            <a:ext cx="8723653" cy="2369880"/>
+            <a:off x="780832" y="1182161"/>
+            <a:ext cx="6612428" cy="1877437"/>
           </a:xfrm>
           <a:prstGeom prst="rect">
             <a:avLst/>
@@ -11522,59 +12527,29 @@
               <a:buChar char="•"/>
             </a:pPr>
             <a:r>
-              <a:rPr lang="en-US" sz="2000" dirty="0">
-                <a:solidFill>
-                  <a:srgbClr val="0070C0"/>
-                </a:solidFill>
-              </a:rPr>
-              <a:t>Store the date as an ISO string: </a:t>
+              <a:rPr lang="en-US" sz="2400" dirty="0">
+                <a:solidFill>
+                  <a:srgbClr val="0070C0"/>
+                </a:solidFill>
+              </a:rPr>
+              <a:t>Store the date as an ISO string: YYYYMMDD</a:t>
             </a:r>
             <a:br>
-              <a:rPr lang="pl-PL" sz="2000" dirty="0">
+              <a:rPr lang="pl-PL" sz="2400" dirty="0">
                 <a:solidFill>
                   <a:srgbClr val="0070C0"/>
                 </a:solidFill>
               </a:rPr>
             </a:br>
             <a:r>
-              <a:rPr lang="pl-PL" sz="2000" dirty="0">
-                <a:solidFill>
-                  <a:srgbClr val="0070C0"/>
-                </a:solidFill>
-              </a:rPr>
-              <a:t>YYYY-MM-DD (Excel mostlikely change the format when saving it csv)</a:t>
-            </a:r>
-            <a:br>
-              <a:rPr lang="pl-PL" sz="2000" dirty="0">
-                <a:solidFill>
-                  <a:srgbClr val="0070C0"/>
-                </a:solidFill>
-              </a:rPr>
-            </a:br>
-            <a:r>
-              <a:rPr lang="en-US" sz="2000" dirty="0">
-                <a:solidFill>
-                  <a:srgbClr val="0070C0"/>
-                </a:solidFill>
-              </a:rPr>
-              <a:t>YYYYMMDD</a:t>
-            </a:r>
-            <a:r>
-              <a:rPr lang="pl-PL" sz="2000" dirty="0">
-                <a:solidFill>
-                  <a:srgbClr val="0070C0"/>
-                </a:solidFill>
-              </a:rPr>
-              <a:t> (Excel resistant)</a:t>
-            </a:r>
-            <a:br>
-              <a:rPr lang="pl-PL" sz="2000" dirty="0">
-                <a:solidFill>
-                  <a:srgbClr val="0070C0"/>
-                </a:solidFill>
-              </a:rPr>
-            </a:br>
-            <a:endParaRPr lang="en-GB" sz="2000" dirty="0">
+              <a:rPr lang="pl-PL" sz="2400" dirty="0">
+                <a:solidFill>
+                  <a:srgbClr val="0070C0"/>
+                </a:solidFill>
+              </a:rPr>
+              <a:t>YYYY-MM-DD</a:t>
+            </a:r>
+            <a:endParaRPr lang="en-GB" sz="2400" dirty="0">
               <a:solidFill>
                 <a:srgbClr val="0070C0"/>
               </a:solidFill>
@@ -11648,7 +12623,7 @@
     </p:spTree>
     <p:extLst>
       <p:ext uri="{BB962C8B-B14F-4D97-AF65-F5344CB8AC3E}">
-        <p14:creationId xmlns:p14="http://schemas.microsoft.com/office/powerpoint/2010/main" val="139045272"/>
+        <p14:creationId xmlns:p14="http://schemas.microsoft.com/office/powerpoint/2010/main" val="3318811806"/>
       </p:ext>
     </p:extLst>
   </p:cSld>
@@ -11923,20 +12898,57 @@
           <a:chExt cx="0" cy="0"/>
         </a:xfrm>
       </p:grpSpPr>
-      <p:sp>
-        <p:nvSpPr>
-          <p:cNvPr id="7" name="Rectangle 6"/>
-          <p:cNvSpPr/>
+      <p:pic>
+        <p:nvPicPr>
+          <p:cNvPr id="3" name="Picture 2">
+            <a:extLst>
+              <a:ext uri="{FF2B5EF4-FFF2-40B4-BE49-F238E27FC236}">
+                <a16:creationId xmlns:a16="http://schemas.microsoft.com/office/drawing/2014/main" id="{DDDFC496-4444-4BD2-84B6-AD60437633A1}"/>
+              </a:ext>
+            </a:extLst>
+          </p:cNvPr>
+          <p:cNvPicPr>
+            <a:picLocks noChangeAspect="1"/>
+          </p:cNvPicPr>
           <p:nvPr/>
-        </p:nvSpPr>
-        <p:spPr>
-          <a:xfrm>
-            <a:off x="811875" y="1418029"/>
-            <a:ext cx="10127472" cy="3785652"/>
+        </p:nvPicPr>
+        <p:blipFill>
+          <a:blip r:embed="rId2"/>
+          <a:stretch>
+            <a:fillRect/>
+          </a:stretch>
+        </p:blipFill>
+        <p:spPr>
+          <a:xfrm>
+            <a:off x="635727" y="1242399"/>
+            <a:ext cx="6033211" cy="4724292"/>
           </a:xfrm>
           <a:prstGeom prst="rect">
             <a:avLst/>
           </a:prstGeom>
+        </p:spPr>
+      </p:pic>
+      <p:sp>
+        <p:nvSpPr>
+          <p:cNvPr id="5" name="TextBox 4">
+            <a:extLst>
+              <a:ext uri="{FF2B5EF4-FFF2-40B4-BE49-F238E27FC236}">
+                <a16:creationId xmlns:a16="http://schemas.microsoft.com/office/drawing/2014/main" id="{75A27D1C-D00A-46AE-8055-4D55D0FE3CB3}"/>
+              </a:ext>
+            </a:extLst>
+          </p:cNvPr>
+          <p:cNvSpPr txBox="1"/>
+          <p:nvPr/>
+        </p:nvSpPr>
+        <p:spPr>
+          <a:xfrm>
+            <a:off x="6799118" y="1908732"/>
+            <a:ext cx="4174836" cy="3970318"/>
+          </a:xfrm>
+          <a:prstGeom prst="rect">
+            <a:avLst/>
+          </a:prstGeom>
+          <a:noFill/>
         </p:spPr>
         <p:txBody>
           <a:bodyPr wrap="square">
@@ -11945,95 +12957,157 @@
           <a:lstStyle/>
           <a:p>
             <a:r>
-              <a:rPr lang="en-GB" sz="2400" dirty="0">
-                <a:solidFill>
-                  <a:srgbClr val="0070C0"/>
-                </a:solidFill>
-              </a:rPr>
-              <a:t>Excel file format .xlsx is now open, and nowadays it is admissible as being FAIR.</a:t>
-            </a:r>
-          </a:p>
-          <a:p>
-            <a:br>
-              <a:rPr lang="en-GB" sz="2400" dirty="0">
-                <a:solidFill>
-                  <a:srgbClr val="0070C0"/>
-                </a:solidFill>
-              </a:rPr>
-            </a:br>
-            <a:r>
-              <a:rPr lang="en-GB" sz="2400" dirty="0">
-                <a:solidFill>
-                  <a:srgbClr val="0070C0"/>
-                </a:solidFill>
-              </a:rPr>
-              <a:t>However, plain text files like coma or tab separated values (.csv, .</a:t>
-            </a:r>
-            <a:r>
-              <a:rPr lang="en-GB" sz="2400" dirty="0" err="1">
-                <a:solidFill>
-                  <a:srgbClr val="0070C0"/>
-                </a:solidFill>
-              </a:rPr>
-              <a:t>tsv</a:t>
-            </a:r>
-            <a:r>
-              <a:rPr lang="en-GB" sz="2400" dirty="0">
-                <a:solidFill>
-                  <a:srgbClr val="0070C0"/>
-                </a:solidFill>
-              </a:rPr>
-              <a:t>) can be accessed without any special software and also be easily imported into other formats and environments, such as SQLite and R. They’re good for maximum portability and endurance.</a:t>
-            </a:r>
-          </a:p>
-          <a:p>
-            <a:endParaRPr lang="en-GB" sz="2400" dirty="0">
+              <a:rPr lang="en-GB" b="0" i="0" dirty="0">
+                <a:solidFill>
+                  <a:schemeClr val="accent5">
+                    <a:lumMod val="75000"/>
+                  </a:schemeClr>
+                </a:solidFill>
+                <a:effectLst/>
+                <a:latin typeface="GuardianTextEgyptian"/>
+              </a:rPr>
+              <a:t>One lab had sent its daily test report to PHE in the form of a CSV file </a:t>
+            </a:r>
+          </a:p>
+          <a:p>
+            <a:endParaRPr lang="en-GB" dirty="0">
               <a:solidFill>
-                <a:srgbClr val="0070C0"/>
+                <a:schemeClr val="accent5">
+                  <a:lumMod val="75000"/>
+                </a:schemeClr>
+              </a:solidFill>
+              <a:latin typeface="GuardianTextEgyptian"/>
+            </a:endParaRPr>
+          </a:p>
+          <a:p>
+            <a:r>
+              <a:rPr lang="en-GB" dirty="0">
+                <a:solidFill>
+                  <a:schemeClr val="accent5">
+                    <a:lumMod val="75000"/>
+                  </a:schemeClr>
+                </a:solidFill>
+                <a:latin typeface="GuardianTextEgyptian"/>
+              </a:rPr>
+              <a:t>PHE </a:t>
+            </a:r>
+            <a:r>
+              <a:rPr lang="en-GB" b="0" i="0" dirty="0">
+                <a:solidFill>
+                  <a:schemeClr val="accent5">
+                    <a:lumMod val="75000"/>
+                  </a:schemeClr>
+                </a:solidFill>
+                <a:effectLst/>
+                <a:latin typeface="GuardianTextEgyptian"/>
+              </a:rPr>
+              <a:t>loaded into Microsoft Excel, and the new tests at the bottom were added to the main database</a:t>
+            </a:r>
+          </a:p>
+          <a:p>
+            <a:endParaRPr lang="en-GB" dirty="0">
+              <a:solidFill>
+                <a:schemeClr val="accent5">
+                  <a:lumMod val="75000"/>
+                </a:schemeClr>
+              </a:solidFill>
+              <a:latin typeface="GuardianTextEgyptian"/>
+            </a:endParaRPr>
+          </a:p>
+          <a:p>
+            <a:r>
+              <a:rPr lang="en-GB" dirty="0">
+                <a:solidFill>
+                  <a:schemeClr val="accent5">
+                    <a:lumMod val="75000"/>
+                  </a:schemeClr>
+                </a:solidFill>
+                <a:latin typeface="GuardianTextEgyptian"/>
+              </a:rPr>
+              <a:t>But Microsoft Excel files can only be 1,048,576 rows long or even less in older versions </a:t>
+            </a:r>
+          </a:p>
+          <a:p>
+            <a:endParaRPr lang="en-GB" dirty="0">
+              <a:solidFill>
+                <a:schemeClr val="accent5">
+                  <a:lumMod val="75000"/>
+                </a:schemeClr>
+              </a:solidFill>
+              <a:latin typeface="GuardianTextEgyptian"/>
+            </a:endParaRPr>
+          </a:p>
+          <a:p>
+            <a:r>
+              <a:rPr lang="en-GB" b="0" i="0" dirty="0">
+                <a:solidFill>
+                  <a:schemeClr val="accent5">
+                    <a:lumMod val="75000"/>
+                  </a:schemeClr>
+                </a:solidFill>
+                <a:effectLst/>
+                <a:latin typeface="GuardianTextEgyptian"/>
+              </a:rPr>
+              <a:t>the bottom rows got cut off and were no longer displayed once the limit was reached</a:t>
+            </a:r>
+            <a:endParaRPr lang="en-GB" dirty="0">
+              <a:solidFill>
+                <a:schemeClr val="accent5">
+                  <a:lumMod val="75000"/>
+                </a:schemeClr>
               </a:solidFill>
             </a:endParaRPr>
           </a:p>
-          <a:p>
-            <a:r>
-              <a:rPr lang="en-GB" sz="2400" dirty="0">
-                <a:solidFill>
-                  <a:srgbClr val="0070C0"/>
-                </a:solidFill>
-              </a:rPr>
-              <a:t>If you only use Excel, and so does your community, just keep using it. Just be aware of possible pitfalls, especially when working with genes(protein)' names(accession numbers).</a:t>
-            </a:r>
-          </a:p>
-        </p:txBody>
-      </p:sp>
-      <p:sp>
-        <p:nvSpPr>
-          <p:cNvPr id="5" name="Title 1">
-            <a:extLst>
-              <a:ext uri="{FF2B5EF4-FFF2-40B4-BE49-F238E27FC236}">
-                <a16:creationId xmlns:a16="http://schemas.microsoft.com/office/drawing/2014/main" id="{F44E9D5B-32F4-6648-8F82-26E5DBED0862}"/>
-              </a:ext>
-            </a:extLst>
-          </p:cNvPr>
-          <p:cNvSpPr>
-            <a:spLocks noGrp="1"/>
+        </p:txBody>
+      </p:sp>
+      <p:sp>
+        <p:nvSpPr>
+          <p:cNvPr id="6" name="Title 1">
+            <a:extLst>
+              <a:ext uri="{FF2B5EF4-FFF2-40B4-BE49-F238E27FC236}">
+                <a16:creationId xmlns:a16="http://schemas.microsoft.com/office/drawing/2014/main" id="{5A0082E2-90F4-488C-A02A-43A7E4403020}"/>
+              </a:ext>
+            </a:extLst>
+          </p:cNvPr>
+          <p:cNvSpPr txBox="1">
+            <a:spLocks/>
           </p:cNvSpPr>
-          <p:nvPr>
-            <p:ph type="title"/>
-          </p:nvPr>
-        </p:nvSpPr>
-        <p:spPr>
-          <a:xfrm>
-            <a:off x="838200" y="24092"/>
+          <p:nvPr/>
+        </p:nvSpPr>
+        <p:spPr>
+          <a:xfrm>
+            <a:off x="838200" y="100561"/>
             <a:ext cx="10515600" cy="1325563"/>
           </a:xfrm>
+          <a:prstGeom prst="rect">
+            <a:avLst/>
+          </a:prstGeom>
         </p:spPr>
         <p:txBody>
           <a:bodyPr/>
-          <a:lstStyle/>
+          <a:lstStyle>
+            <a:lvl1pPr algn="l" defTabSz="914400" rtl="0" eaLnBrk="1" latinLnBrk="0" hangingPunct="1">
+              <a:lnSpc>
+                <a:spcPct val="90000"/>
+              </a:lnSpc>
+              <a:spcBef>
+                <a:spcPct val="0"/>
+              </a:spcBef>
+              <a:buNone/>
+              <a:defRPr sz="4400" kern="1200">
+                <a:solidFill>
+                  <a:srgbClr val="0070C0"/>
+                </a:solidFill>
+                <a:latin typeface="+mj-lt"/>
+                <a:ea typeface="+mj-ea"/>
+                <a:cs typeface="+mj-cs"/>
+              </a:defRPr>
+            </a:lvl1pPr>
+          </a:lstStyle>
           <a:p>
             <a:r>
               <a:rPr lang="en-GB" dirty="0"/>
-              <a:t>To use or not to use Excel</a:t>
+              <a:t>Other potential limitation</a:t>
             </a:r>
           </a:p>
         </p:txBody>
@@ -12041,7 +13115,7 @@
     </p:spTree>
     <p:extLst>
       <p:ext uri="{BB962C8B-B14F-4D97-AF65-F5344CB8AC3E}">
-        <p14:creationId xmlns:p14="http://schemas.microsoft.com/office/powerpoint/2010/main" val="802187606"/>
+        <p14:creationId xmlns:p14="http://schemas.microsoft.com/office/powerpoint/2010/main" val="1911221142"/>
       </p:ext>
     </p:extLst>
   </p:cSld>
@@ -12052,6 +13126,151 @@
 </file>
 
 <file path=ppt/slides/slide31.xml><?xml version="1.0" encoding="utf-8"?>
+<p:sld xmlns:a="http://schemas.openxmlformats.org/drawingml/2006/main" xmlns:r="http://schemas.openxmlformats.org/officeDocument/2006/relationships" xmlns:p="http://schemas.openxmlformats.org/presentationml/2006/main">
+  <p:cSld>
+    <p:spTree>
+      <p:nvGrpSpPr>
+        <p:cNvPr id="1" name=""/>
+        <p:cNvGrpSpPr/>
+        <p:nvPr/>
+      </p:nvGrpSpPr>
+      <p:grpSpPr>
+        <a:xfrm>
+          <a:off x="0" y="0"/>
+          <a:ext cx="0" cy="0"/>
+          <a:chOff x="0" y="0"/>
+          <a:chExt cx="0" cy="0"/>
+        </a:xfrm>
+      </p:grpSpPr>
+      <p:sp>
+        <p:nvSpPr>
+          <p:cNvPr id="7" name="Rectangle 6"/>
+          <p:cNvSpPr/>
+          <p:nvPr/>
+        </p:nvSpPr>
+        <p:spPr>
+          <a:xfrm>
+            <a:off x="811875" y="1418029"/>
+            <a:ext cx="10127472" cy="3785652"/>
+          </a:xfrm>
+          <a:prstGeom prst="rect">
+            <a:avLst/>
+          </a:prstGeom>
+        </p:spPr>
+        <p:txBody>
+          <a:bodyPr wrap="square">
+            <a:spAutoFit/>
+          </a:bodyPr>
+          <a:lstStyle/>
+          <a:p>
+            <a:r>
+              <a:rPr lang="en-GB" sz="2400" dirty="0">
+                <a:solidFill>
+                  <a:srgbClr val="0070C0"/>
+                </a:solidFill>
+              </a:rPr>
+              <a:t>Excel file format .xlsx is now open, and nowadays it is admissible as being FAIR.</a:t>
+            </a:r>
+          </a:p>
+          <a:p>
+            <a:br>
+              <a:rPr lang="en-GB" sz="2400" dirty="0">
+                <a:solidFill>
+                  <a:srgbClr val="0070C0"/>
+                </a:solidFill>
+              </a:rPr>
+            </a:br>
+            <a:r>
+              <a:rPr lang="en-GB" sz="2400" dirty="0">
+                <a:solidFill>
+                  <a:srgbClr val="0070C0"/>
+                </a:solidFill>
+              </a:rPr>
+              <a:t>However, plain text files like coma or tab separated values (.csv, .</a:t>
+            </a:r>
+            <a:r>
+              <a:rPr lang="en-GB" sz="2400" dirty="0" err="1">
+                <a:solidFill>
+                  <a:srgbClr val="0070C0"/>
+                </a:solidFill>
+              </a:rPr>
+              <a:t>tsv</a:t>
+            </a:r>
+            <a:r>
+              <a:rPr lang="en-GB" sz="2400" dirty="0">
+                <a:solidFill>
+                  <a:srgbClr val="0070C0"/>
+                </a:solidFill>
+              </a:rPr>
+              <a:t>) can be accessed without any special software and also be easily imported into other formats and environments, such as SQLite and R. They’re good for maximum portability and endurance.</a:t>
+            </a:r>
+          </a:p>
+          <a:p>
+            <a:endParaRPr lang="en-GB" sz="2400" dirty="0">
+              <a:solidFill>
+                <a:srgbClr val="0070C0"/>
+              </a:solidFill>
+            </a:endParaRPr>
+          </a:p>
+          <a:p>
+            <a:r>
+              <a:rPr lang="en-GB" sz="2400" dirty="0">
+                <a:solidFill>
+                  <a:srgbClr val="0070C0"/>
+                </a:solidFill>
+              </a:rPr>
+              <a:t>If you only use Excel, and so does your community, just keep using it. Just be aware of possible pitfalls, especially when working with genes(protein)' names(accession numbers).</a:t>
+            </a:r>
+          </a:p>
+        </p:txBody>
+      </p:sp>
+      <p:sp>
+        <p:nvSpPr>
+          <p:cNvPr id="5" name="Title 1">
+            <a:extLst>
+              <a:ext uri="{FF2B5EF4-FFF2-40B4-BE49-F238E27FC236}">
+                <a16:creationId xmlns:a16="http://schemas.microsoft.com/office/drawing/2014/main" id="{F44E9D5B-32F4-6648-8F82-26E5DBED0862}"/>
+              </a:ext>
+            </a:extLst>
+          </p:cNvPr>
+          <p:cNvSpPr>
+            <a:spLocks noGrp="1"/>
+          </p:cNvSpPr>
+          <p:nvPr>
+            <p:ph type="title"/>
+          </p:nvPr>
+        </p:nvSpPr>
+        <p:spPr>
+          <a:xfrm>
+            <a:off x="838200" y="24092"/>
+            <a:ext cx="10515600" cy="1325563"/>
+          </a:xfrm>
+        </p:spPr>
+        <p:txBody>
+          <a:bodyPr/>
+          <a:lstStyle/>
+          <a:p>
+            <a:r>
+              <a:rPr lang="en-GB" dirty="0"/>
+              <a:t>To use or not to use Excel</a:t>
+            </a:r>
+          </a:p>
+        </p:txBody>
+      </p:sp>
+    </p:spTree>
+    <p:extLst>
+      <p:ext uri="{BB962C8B-B14F-4D97-AF65-F5344CB8AC3E}">
+        <p14:creationId xmlns:p14="http://schemas.microsoft.com/office/powerpoint/2010/main" val="835113837"/>
+      </p:ext>
+    </p:extLst>
+  </p:cSld>
+  <p:clrMapOvr>
+    <a:masterClrMapping/>
+  </p:clrMapOvr>
+</p:sld>
+</file>
+
+<file path=ppt/slides/slide32.xml><?xml version="1.0" encoding="utf-8"?>
 <p:sld xmlns:a="http://schemas.openxmlformats.org/drawingml/2006/main" xmlns:r="http://schemas.openxmlformats.org/officeDocument/2006/relationships" xmlns:p="http://schemas.openxmlformats.org/presentationml/2006/main">
   <p:cSld>
     <p:spTree>
@@ -12461,7 +13680,7 @@
     </p:spTree>
     <p:extLst>
       <p:ext uri="{BB962C8B-B14F-4D97-AF65-F5344CB8AC3E}">
-        <p14:creationId xmlns:p14="http://schemas.microsoft.com/office/powerpoint/2010/main" val="693671975"/>
+        <p14:creationId xmlns:p14="http://schemas.microsoft.com/office/powerpoint/2010/main" val="2587376675"/>
       </p:ext>
     </p:extLst>
   </p:cSld>
@@ -12471,7 +13690,7 @@
 </p:sld>
 </file>
 
-<file path=ppt/slides/slide32.xml><?xml version="1.0" encoding="utf-8"?>
+<file path=ppt/slides/slide33.xml><?xml version="1.0" encoding="utf-8"?>
 <p:sld xmlns:a="http://schemas.openxmlformats.org/drawingml/2006/main" xmlns:r="http://schemas.openxmlformats.org/officeDocument/2006/relationships" xmlns:p="http://schemas.openxmlformats.org/presentationml/2006/main">
   <p:cSld>
     <p:spTree>
@@ -12580,7 +13799,7 @@
         <p:spPr>
           <a:xfrm>
             <a:off x="719579" y="2227704"/>
-            <a:ext cx="6096000" cy="3139321"/>
+            <a:ext cx="6096000" cy="2308324"/>
           </a:xfrm>
           <a:prstGeom prst="rect">
             <a:avLst/>
@@ -12668,55 +13887,13 @@
               </a:rPr>
               <a:t>It is easier to store data in the correct form than to clean data for reuse</a:t>
             </a:r>
-            <a:endParaRPr lang="pl-PL" dirty="0">
-              <a:solidFill>
-                <a:srgbClr val="0070C0"/>
-              </a:solidFill>
-            </a:endParaRPr>
-          </a:p>
-          <a:p>
-            <a:pPr marL="285750" indent="-285750">
-              <a:buFont typeface="Arial" panose="020B0604020202020204" pitchFamily="34" charset="0"/>
-              <a:buChar char="•"/>
-            </a:pPr>
-            <a:endParaRPr lang="pl-PL" dirty="0">
-              <a:solidFill>
-                <a:srgbClr val="0070C0"/>
-              </a:solidFill>
-            </a:endParaRPr>
-          </a:p>
-          <a:p>
-            <a:pPr marL="285750" indent="-285750">
-              <a:buFont typeface="Arial" panose="020B0604020202020204" pitchFamily="34" charset="0"/>
-              <a:buChar char="•"/>
-            </a:pPr>
-            <a:endParaRPr lang="pl-PL" dirty="0">
-              <a:solidFill>
-                <a:srgbClr val="0070C0"/>
-              </a:solidFill>
-            </a:endParaRPr>
-          </a:p>
-          <a:p>
-            <a:r>
-              <a:rPr lang="pl-PL" dirty="0">
-                <a:solidFill>
-                  <a:srgbClr val="0070C0"/>
-                </a:solidFill>
-              </a:rPr>
-              <a:t>DO THE QUIZ!!!</a:t>
-            </a:r>
-            <a:endParaRPr lang="en-GB" dirty="0">
-              <a:solidFill>
-                <a:srgbClr val="0070C0"/>
-              </a:solidFill>
-            </a:endParaRPr>
           </a:p>
         </p:txBody>
       </p:sp>
     </p:spTree>
     <p:extLst>
       <p:ext uri="{BB962C8B-B14F-4D97-AF65-F5344CB8AC3E}">
-        <p14:creationId xmlns:p14="http://schemas.microsoft.com/office/powerpoint/2010/main" val="3572305577"/>
+        <p14:creationId xmlns:p14="http://schemas.microsoft.com/office/powerpoint/2010/main" val="2058253827"/>
       </p:ext>
     </p:extLst>
   </p:cSld>

</xml_diff>